<commit_message>
presentation updated, README updated
</commit_message>
<xml_diff>
--- a/Presentation PowerPoint/Project-Presentation-Template.pptx
+++ b/Presentation PowerPoint/Project-Presentation-Template.pptx
@@ -4,17 +4,22 @@
   <p:sldMasterIdLst>
     <p:sldMasterId id="2147483648" r:id="rId1"/>
   </p:sldMasterIdLst>
+  <p:notesMasterIdLst>
+    <p:notesMasterId r:id="rId14"/>
+  </p:notesMasterIdLst>
   <p:sldIdLst>
     <p:sldId id="256" r:id="rId2"/>
     <p:sldId id="257" r:id="rId3"/>
     <p:sldId id="259" r:id="rId4"/>
     <p:sldId id="258" r:id="rId5"/>
     <p:sldId id="260" r:id="rId6"/>
-    <p:sldId id="263" r:id="rId7"/>
-    <p:sldId id="261" r:id="rId8"/>
-    <p:sldId id="264" r:id="rId9"/>
-    <p:sldId id="262" r:id="rId10"/>
-    <p:sldId id="265" r:id="rId11"/>
+    <p:sldId id="266" r:id="rId7"/>
+    <p:sldId id="267" r:id="rId8"/>
+    <p:sldId id="263" r:id="rId9"/>
+    <p:sldId id="261" r:id="rId10"/>
+    <p:sldId id="264" r:id="rId11"/>
+    <p:sldId id="262" r:id="rId12"/>
+    <p:sldId id="265" r:id="rId13"/>
   </p:sldIdLst>
   <p:sldSz cx="12192000" cy="6858000"/>
   <p:notesSz cx="6858000" cy="9144000"/>
@@ -121,6 +126,663 @@
 </p:presentation>
 </file>
 
+<file path=ppt/notesMasters/notesMaster1.xml><?xml version="1.0" encoding="utf-8"?>
+<p:notesMaster xmlns:a="http://schemas.openxmlformats.org/drawingml/2006/main" xmlns:r="http://schemas.openxmlformats.org/officeDocument/2006/relationships" xmlns:p="http://schemas.openxmlformats.org/presentationml/2006/main">
+  <p:cSld>
+    <p:bg>
+      <p:bgRef idx="1001">
+        <a:schemeClr val="bg1"/>
+      </p:bgRef>
+    </p:bg>
+    <p:spTree>
+      <p:nvGrpSpPr>
+        <p:cNvPr id="1" name=""/>
+        <p:cNvGrpSpPr/>
+        <p:nvPr/>
+      </p:nvGrpSpPr>
+      <p:grpSpPr>
+        <a:xfrm>
+          <a:off x="0" y="0"/>
+          <a:ext cx="0" cy="0"/>
+          <a:chOff x="0" y="0"/>
+          <a:chExt cx="0" cy="0"/>
+        </a:xfrm>
+      </p:grpSpPr>
+      <p:sp>
+        <p:nvSpPr>
+          <p:cNvPr id="2" name="Header Placeholder 1"/>
+          <p:cNvSpPr>
+            <a:spLocks noGrp="1"/>
+          </p:cNvSpPr>
+          <p:nvPr>
+            <p:ph type="hdr" sz="quarter"/>
+          </p:nvPr>
+        </p:nvSpPr>
+        <p:spPr>
+          <a:xfrm>
+            <a:off x="0" y="0"/>
+            <a:ext cx="2971800" cy="458788"/>
+          </a:xfrm>
+          <a:prstGeom prst="rect">
+            <a:avLst/>
+          </a:prstGeom>
+        </p:spPr>
+        <p:txBody>
+          <a:bodyPr vert="horz" lIns="91440" tIns="45720" rIns="91440" bIns="45720" rtlCol="0"/>
+          <a:lstStyle>
+            <a:lvl1pPr algn="l">
+              <a:defRPr sz="1200"/>
+            </a:lvl1pPr>
+          </a:lstStyle>
+          <a:p>
+            <a:endParaRPr lang="en-US"/>
+          </a:p>
+        </p:txBody>
+      </p:sp>
+      <p:sp>
+        <p:nvSpPr>
+          <p:cNvPr id="3" name="Date Placeholder 2"/>
+          <p:cNvSpPr>
+            <a:spLocks noGrp="1"/>
+          </p:cNvSpPr>
+          <p:nvPr>
+            <p:ph type="dt" idx="1"/>
+          </p:nvPr>
+        </p:nvSpPr>
+        <p:spPr>
+          <a:xfrm>
+            <a:off x="3884613" y="0"/>
+            <a:ext cx="2971800" cy="458788"/>
+          </a:xfrm>
+          <a:prstGeom prst="rect">
+            <a:avLst/>
+          </a:prstGeom>
+        </p:spPr>
+        <p:txBody>
+          <a:bodyPr vert="horz" lIns="91440" tIns="45720" rIns="91440" bIns="45720" rtlCol="0"/>
+          <a:lstStyle>
+            <a:lvl1pPr algn="r">
+              <a:defRPr sz="1200"/>
+            </a:lvl1pPr>
+          </a:lstStyle>
+          <a:p>
+            <a:fld id="{554293D9-CEF4-E549-8C2B-4C1F408488E2}" type="datetimeFigureOut">
+              <a:rPr lang="en-US" smtClean="0"/>
+              <a:t>11/21/22</a:t>
+            </a:fld>
+            <a:endParaRPr lang="en-US"/>
+          </a:p>
+        </p:txBody>
+      </p:sp>
+      <p:sp>
+        <p:nvSpPr>
+          <p:cNvPr id="4" name="Slide Image Placeholder 3"/>
+          <p:cNvSpPr>
+            <a:spLocks noGrp="1" noRot="1" noChangeAspect="1"/>
+          </p:cNvSpPr>
+          <p:nvPr>
+            <p:ph type="sldImg" idx="2"/>
+          </p:nvPr>
+        </p:nvSpPr>
+        <p:spPr>
+          <a:xfrm>
+            <a:off x="685800" y="1143000"/>
+            <a:ext cx="5486400" cy="3086100"/>
+          </a:xfrm>
+          <a:prstGeom prst="rect">
+            <a:avLst/>
+          </a:prstGeom>
+          <a:noFill/>
+          <a:ln w="12700">
+            <a:solidFill>
+              <a:prstClr val="black"/>
+            </a:solidFill>
+          </a:ln>
+        </p:spPr>
+        <p:txBody>
+          <a:bodyPr vert="horz" lIns="91440" tIns="45720" rIns="91440" bIns="45720" rtlCol="0" anchor="ctr"/>
+          <a:lstStyle/>
+          <a:p>
+            <a:endParaRPr lang="en-US"/>
+          </a:p>
+        </p:txBody>
+      </p:sp>
+      <p:sp>
+        <p:nvSpPr>
+          <p:cNvPr id="5" name="Notes Placeholder 4"/>
+          <p:cNvSpPr>
+            <a:spLocks noGrp="1"/>
+          </p:cNvSpPr>
+          <p:nvPr>
+            <p:ph type="body" sz="quarter" idx="3"/>
+          </p:nvPr>
+        </p:nvSpPr>
+        <p:spPr>
+          <a:xfrm>
+            <a:off x="685800" y="4400550"/>
+            <a:ext cx="5486400" cy="3600450"/>
+          </a:xfrm>
+          <a:prstGeom prst="rect">
+            <a:avLst/>
+          </a:prstGeom>
+        </p:spPr>
+        <p:txBody>
+          <a:bodyPr vert="horz" lIns="91440" tIns="45720" rIns="91440" bIns="45720" rtlCol="0"/>
+          <a:lstStyle/>
+          <a:p>
+            <a:pPr lvl="0"/>
+            <a:r>
+              <a:rPr lang="en-US"/>
+              <a:t>Click to edit Master text styles</a:t>
+            </a:r>
+          </a:p>
+          <a:p>
+            <a:pPr lvl="1"/>
+            <a:r>
+              <a:rPr lang="en-US"/>
+              <a:t>Second level</a:t>
+            </a:r>
+          </a:p>
+          <a:p>
+            <a:pPr lvl="2"/>
+            <a:r>
+              <a:rPr lang="en-US"/>
+              <a:t>Third level</a:t>
+            </a:r>
+          </a:p>
+          <a:p>
+            <a:pPr lvl="3"/>
+            <a:r>
+              <a:rPr lang="en-US"/>
+              <a:t>Fourth level</a:t>
+            </a:r>
+          </a:p>
+          <a:p>
+            <a:pPr lvl="4"/>
+            <a:r>
+              <a:rPr lang="en-US"/>
+              <a:t>Fifth level</a:t>
+            </a:r>
+          </a:p>
+        </p:txBody>
+      </p:sp>
+      <p:sp>
+        <p:nvSpPr>
+          <p:cNvPr id="6" name="Footer Placeholder 5"/>
+          <p:cNvSpPr>
+            <a:spLocks noGrp="1"/>
+          </p:cNvSpPr>
+          <p:nvPr>
+            <p:ph type="ftr" sz="quarter" idx="4"/>
+          </p:nvPr>
+        </p:nvSpPr>
+        <p:spPr>
+          <a:xfrm>
+            <a:off x="0" y="8685213"/>
+            <a:ext cx="2971800" cy="458787"/>
+          </a:xfrm>
+          <a:prstGeom prst="rect">
+            <a:avLst/>
+          </a:prstGeom>
+        </p:spPr>
+        <p:txBody>
+          <a:bodyPr vert="horz" lIns="91440" tIns="45720" rIns="91440" bIns="45720" rtlCol="0" anchor="b"/>
+          <a:lstStyle>
+            <a:lvl1pPr algn="l">
+              <a:defRPr sz="1200"/>
+            </a:lvl1pPr>
+          </a:lstStyle>
+          <a:p>
+            <a:endParaRPr lang="en-US"/>
+          </a:p>
+        </p:txBody>
+      </p:sp>
+      <p:sp>
+        <p:nvSpPr>
+          <p:cNvPr id="7" name="Slide Number Placeholder 6"/>
+          <p:cNvSpPr>
+            <a:spLocks noGrp="1"/>
+          </p:cNvSpPr>
+          <p:nvPr>
+            <p:ph type="sldNum" sz="quarter" idx="5"/>
+          </p:nvPr>
+        </p:nvSpPr>
+        <p:spPr>
+          <a:xfrm>
+            <a:off x="3884613" y="8685213"/>
+            <a:ext cx="2971800" cy="458787"/>
+          </a:xfrm>
+          <a:prstGeom prst="rect">
+            <a:avLst/>
+          </a:prstGeom>
+        </p:spPr>
+        <p:txBody>
+          <a:bodyPr vert="horz" lIns="91440" tIns="45720" rIns="91440" bIns="45720" rtlCol="0" anchor="b"/>
+          <a:lstStyle>
+            <a:lvl1pPr algn="r">
+              <a:defRPr sz="1200"/>
+            </a:lvl1pPr>
+          </a:lstStyle>
+          <a:p>
+            <a:fld id="{941248EB-719A-B944-B3C9-708649C4FE49}" type="slidenum">
+              <a:rPr lang="en-US" smtClean="0"/>
+              <a:t>‹#›</a:t>
+            </a:fld>
+            <a:endParaRPr lang="en-US"/>
+          </a:p>
+        </p:txBody>
+      </p:sp>
+    </p:spTree>
+    <p:extLst>
+      <p:ext uri="{BB962C8B-B14F-4D97-AF65-F5344CB8AC3E}">
+        <p14:creationId xmlns:p14="http://schemas.microsoft.com/office/powerpoint/2010/main" val="1082100455"/>
+      </p:ext>
+    </p:extLst>
+  </p:cSld>
+  <p:clrMap bg1="lt1" tx1="dk1" bg2="lt2" tx2="dk2" accent1="accent1" accent2="accent2" accent3="accent3" accent4="accent4" accent5="accent5" accent6="accent6" hlink="hlink" folHlink="folHlink"/>
+  <p:notesStyle>
+    <a:lvl1pPr marL="0" algn="l" defTabSz="914400" rtl="0" eaLnBrk="1" latinLnBrk="0" hangingPunct="1">
+      <a:defRPr sz="1200" kern="1200">
+        <a:solidFill>
+          <a:schemeClr val="tx1"/>
+        </a:solidFill>
+        <a:latin typeface="+mn-lt"/>
+        <a:ea typeface="+mn-ea"/>
+        <a:cs typeface="+mn-cs"/>
+      </a:defRPr>
+    </a:lvl1pPr>
+    <a:lvl2pPr marL="457200" algn="l" defTabSz="914400" rtl="0" eaLnBrk="1" latinLnBrk="0" hangingPunct="1">
+      <a:defRPr sz="1200" kern="1200">
+        <a:solidFill>
+          <a:schemeClr val="tx1"/>
+        </a:solidFill>
+        <a:latin typeface="+mn-lt"/>
+        <a:ea typeface="+mn-ea"/>
+        <a:cs typeface="+mn-cs"/>
+      </a:defRPr>
+    </a:lvl2pPr>
+    <a:lvl3pPr marL="914400" algn="l" defTabSz="914400" rtl="0" eaLnBrk="1" latinLnBrk="0" hangingPunct="1">
+      <a:defRPr sz="1200" kern="1200">
+        <a:solidFill>
+          <a:schemeClr val="tx1"/>
+        </a:solidFill>
+        <a:latin typeface="+mn-lt"/>
+        <a:ea typeface="+mn-ea"/>
+        <a:cs typeface="+mn-cs"/>
+      </a:defRPr>
+    </a:lvl3pPr>
+    <a:lvl4pPr marL="1371600" algn="l" defTabSz="914400" rtl="0" eaLnBrk="1" latinLnBrk="0" hangingPunct="1">
+      <a:defRPr sz="1200" kern="1200">
+        <a:solidFill>
+          <a:schemeClr val="tx1"/>
+        </a:solidFill>
+        <a:latin typeface="+mn-lt"/>
+        <a:ea typeface="+mn-ea"/>
+        <a:cs typeface="+mn-cs"/>
+      </a:defRPr>
+    </a:lvl4pPr>
+    <a:lvl5pPr marL="1828800" algn="l" defTabSz="914400" rtl="0" eaLnBrk="1" latinLnBrk="0" hangingPunct="1">
+      <a:defRPr sz="1200" kern="1200">
+        <a:solidFill>
+          <a:schemeClr val="tx1"/>
+        </a:solidFill>
+        <a:latin typeface="+mn-lt"/>
+        <a:ea typeface="+mn-ea"/>
+        <a:cs typeface="+mn-cs"/>
+      </a:defRPr>
+    </a:lvl5pPr>
+    <a:lvl6pPr marL="2286000" algn="l" defTabSz="914400" rtl="0" eaLnBrk="1" latinLnBrk="0" hangingPunct="1">
+      <a:defRPr sz="1200" kern="1200">
+        <a:solidFill>
+          <a:schemeClr val="tx1"/>
+        </a:solidFill>
+        <a:latin typeface="+mn-lt"/>
+        <a:ea typeface="+mn-ea"/>
+        <a:cs typeface="+mn-cs"/>
+      </a:defRPr>
+    </a:lvl6pPr>
+    <a:lvl7pPr marL="2743200" algn="l" defTabSz="914400" rtl="0" eaLnBrk="1" latinLnBrk="0" hangingPunct="1">
+      <a:defRPr sz="1200" kern="1200">
+        <a:solidFill>
+          <a:schemeClr val="tx1"/>
+        </a:solidFill>
+        <a:latin typeface="+mn-lt"/>
+        <a:ea typeface="+mn-ea"/>
+        <a:cs typeface="+mn-cs"/>
+      </a:defRPr>
+    </a:lvl7pPr>
+    <a:lvl8pPr marL="3200400" algn="l" defTabSz="914400" rtl="0" eaLnBrk="1" latinLnBrk="0" hangingPunct="1">
+      <a:defRPr sz="1200" kern="1200">
+        <a:solidFill>
+          <a:schemeClr val="tx1"/>
+        </a:solidFill>
+        <a:latin typeface="+mn-lt"/>
+        <a:ea typeface="+mn-ea"/>
+        <a:cs typeface="+mn-cs"/>
+      </a:defRPr>
+    </a:lvl8pPr>
+    <a:lvl9pPr marL="3657600" algn="l" defTabSz="914400" rtl="0" eaLnBrk="1" latinLnBrk="0" hangingPunct="1">
+      <a:defRPr sz="1200" kern="1200">
+        <a:solidFill>
+          <a:schemeClr val="tx1"/>
+        </a:solidFill>
+        <a:latin typeface="+mn-lt"/>
+        <a:ea typeface="+mn-ea"/>
+        <a:cs typeface="+mn-cs"/>
+      </a:defRPr>
+    </a:lvl9pPr>
+  </p:notesStyle>
+</p:notesMaster>
+</file>
+
+<file path=ppt/notesSlides/notesSlide1.xml><?xml version="1.0" encoding="utf-8"?>
+<p:notes xmlns:a="http://schemas.openxmlformats.org/drawingml/2006/main" xmlns:r="http://schemas.openxmlformats.org/officeDocument/2006/relationships" xmlns:p="http://schemas.openxmlformats.org/presentationml/2006/main">
+  <p:cSld>
+    <p:spTree>
+      <p:nvGrpSpPr>
+        <p:cNvPr id="1" name=""/>
+        <p:cNvGrpSpPr/>
+        <p:nvPr/>
+      </p:nvGrpSpPr>
+      <p:grpSpPr>
+        <a:xfrm>
+          <a:off x="0" y="0"/>
+          <a:ext cx="0" cy="0"/>
+          <a:chOff x="0" y="0"/>
+          <a:chExt cx="0" cy="0"/>
+        </a:xfrm>
+      </p:grpSpPr>
+      <p:sp>
+        <p:nvSpPr>
+          <p:cNvPr id="2" name="Slide Image Placeholder 1"/>
+          <p:cNvSpPr>
+            <a:spLocks noGrp="1" noRot="1" noChangeAspect="1"/>
+          </p:cNvSpPr>
+          <p:nvPr>
+            <p:ph type="sldImg"/>
+          </p:nvPr>
+        </p:nvSpPr>
+        <p:spPr/>
+      </p:sp>
+      <p:sp>
+        <p:nvSpPr>
+          <p:cNvPr id="3" name="Notes Placeholder 2"/>
+          <p:cNvSpPr>
+            <a:spLocks noGrp="1"/>
+          </p:cNvSpPr>
+          <p:nvPr>
+            <p:ph type="body" idx="1"/>
+          </p:nvPr>
+        </p:nvSpPr>
+        <p:spPr/>
+        <p:txBody>
+          <a:bodyPr/>
+          <a:lstStyle/>
+          <a:p>
+            <a:r>
+              <a:rPr lang="en-US" b="1" dirty="0"/>
+              <a:t>Decipher the Information in URLs</a:t>
+            </a:r>
+          </a:p>
+          <a:p>
+            <a:r>
+              <a:rPr lang="en-US" dirty="0"/>
+              <a:t>A programmer can encode a lot of information in a URL. Your web scraping journey will be much easier if you first become familiar with how URLs work and what they’re made of.</a:t>
+            </a:r>
+          </a:p>
+          <a:p>
+            <a:r>
+              <a:rPr lang="en-US" dirty="0"/>
+              <a:t>websites can use </a:t>
+            </a:r>
+            <a:r>
+              <a:rPr lang="en-US" b="1" dirty="0"/>
+              <a:t>query parameters</a:t>
+            </a:r>
+            <a:r>
+              <a:rPr lang="en-US" dirty="0"/>
+              <a:t> to encode values that you submit when performing a search.</a:t>
+            </a:r>
+          </a:p>
+          <a:p>
+            <a:endParaRPr lang="en-US" dirty="0"/>
+          </a:p>
+          <a:p>
+            <a:pPr marL="0" marR="0" lvl="0" indent="0" algn="l" defTabSz="914400" rtl="0" eaLnBrk="1" fontAlgn="auto" latinLnBrk="0" hangingPunct="1">
+              <a:lnSpc>
+                <a:spcPct val="100000"/>
+              </a:lnSpc>
+              <a:spcBef>
+                <a:spcPts val="0"/>
+              </a:spcBef>
+              <a:spcAft>
+                <a:spcPts val="0"/>
+              </a:spcAft>
+              <a:buClrTx/>
+              <a:buSzTx/>
+              <a:buFontTx/>
+              <a:buNone/>
+              <a:tabLst/>
+              <a:defRPr/>
+            </a:pPr>
+            <a:r>
+              <a:rPr lang="en-US" sz="1200" b="1" dirty="0"/>
+              <a:t>Parse HTML Code With Beautiful Soup</a:t>
+            </a:r>
+            <a:endParaRPr lang="en-US" dirty="0"/>
+          </a:p>
+          <a:p>
+            <a:r>
+              <a:rPr lang="en-US" dirty="0">
+                <a:hlinkClick r:id="rId3"/>
+              </a:rPr>
+              <a:t>Beautiful Soup</a:t>
+            </a:r>
+            <a:r>
+              <a:rPr lang="en-US" dirty="0"/>
+              <a:t> is a Python library for </a:t>
+            </a:r>
+            <a:r>
+              <a:rPr lang="en-US" b="1" dirty="0"/>
+              <a:t>parsing structured data</a:t>
+            </a:r>
+            <a:r>
+              <a:rPr lang="en-US" dirty="0"/>
+              <a:t>. It allows you to interact with HTML in a similar way to how you interact with a web page using developer tools</a:t>
+            </a:r>
+          </a:p>
+        </p:txBody>
+      </p:sp>
+      <p:sp>
+        <p:nvSpPr>
+          <p:cNvPr id="4" name="Slide Number Placeholder 3"/>
+          <p:cNvSpPr>
+            <a:spLocks noGrp="1"/>
+          </p:cNvSpPr>
+          <p:nvPr>
+            <p:ph type="sldNum" sz="quarter" idx="5"/>
+          </p:nvPr>
+        </p:nvSpPr>
+        <p:spPr/>
+        <p:txBody>
+          <a:bodyPr/>
+          <a:lstStyle/>
+          <a:p>
+            <a:fld id="{941248EB-719A-B944-B3C9-708649C4FE49}" type="slidenum">
+              <a:rPr lang="en-US" smtClean="0"/>
+              <a:t>6</a:t>
+            </a:fld>
+            <a:endParaRPr lang="en-US"/>
+          </a:p>
+        </p:txBody>
+      </p:sp>
+    </p:spTree>
+    <p:extLst>
+      <p:ext uri="{BB962C8B-B14F-4D97-AF65-F5344CB8AC3E}">
+        <p14:creationId xmlns:p14="http://schemas.microsoft.com/office/powerpoint/2010/main" val="1090921443"/>
+      </p:ext>
+    </p:extLst>
+  </p:cSld>
+  <p:clrMapOvr>
+    <a:masterClrMapping/>
+  </p:clrMapOvr>
+</p:notes>
+</file>
+
+<file path=ppt/notesSlides/notesSlide2.xml><?xml version="1.0" encoding="utf-8"?>
+<p:notes xmlns:a="http://schemas.openxmlformats.org/drawingml/2006/main" xmlns:r="http://schemas.openxmlformats.org/officeDocument/2006/relationships" xmlns:p="http://schemas.openxmlformats.org/presentationml/2006/main">
+  <p:cSld>
+    <p:spTree>
+      <p:nvGrpSpPr>
+        <p:cNvPr id="1" name=""/>
+        <p:cNvGrpSpPr/>
+        <p:nvPr/>
+      </p:nvGrpSpPr>
+      <p:grpSpPr>
+        <a:xfrm>
+          <a:off x="0" y="0"/>
+          <a:ext cx="0" cy="0"/>
+          <a:chOff x="0" y="0"/>
+          <a:chExt cx="0" cy="0"/>
+        </a:xfrm>
+      </p:grpSpPr>
+      <p:sp>
+        <p:nvSpPr>
+          <p:cNvPr id="2" name="Slide Image Placeholder 1"/>
+          <p:cNvSpPr>
+            <a:spLocks noGrp="1" noRot="1" noChangeAspect="1"/>
+          </p:cNvSpPr>
+          <p:nvPr>
+            <p:ph type="sldImg"/>
+          </p:nvPr>
+        </p:nvSpPr>
+        <p:spPr/>
+      </p:sp>
+      <p:sp>
+        <p:nvSpPr>
+          <p:cNvPr id="3" name="Notes Placeholder 2"/>
+          <p:cNvSpPr>
+            <a:spLocks noGrp="1"/>
+          </p:cNvSpPr>
+          <p:nvPr>
+            <p:ph type="body" idx="1"/>
+          </p:nvPr>
+        </p:nvSpPr>
+        <p:spPr/>
+        <p:txBody>
+          <a:bodyPr/>
+          <a:lstStyle/>
+          <a:p>
+            <a:r>
+              <a:rPr lang="en-US" b="1" dirty="0"/>
+              <a:t>Decipher the Information in URLs</a:t>
+            </a:r>
+          </a:p>
+          <a:p>
+            <a:r>
+              <a:rPr lang="en-US" dirty="0"/>
+              <a:t>A programmer can encode a lot of information in a URL. Your web scraping journey will be much easier if you first become familiar with how URLs work and what they’re made of.</a:t>
+            </a:r>
+          </a:p>
+          <a:p>
+            <a:r>
+              <a:rPr lang="en-US" dirty="0"/>
+              <a:t>websites can use </a:t>
+            </a:r>
+            <a:r>
+              <a:rPr lang="en-US" b="1" dirty="0"/>
+              <a:t>query parameters</a:t>
+            </a:r>
+            <a:r>
+              <a:rPr lang="en-US" dirty="0"/>
+              <a:t> to encode values that you submit when performing a search.</a:t>
+            </a:r>
+          </a:p>
+          <a:p>
+            <a:endParaRPr lang="en-US" dirty="0"/>
+          </a:p>
+          <a:p>
+            <a:pPr marL="0" marR="0" lvl="0" indent="0" algn="l" defTabSz="914400" rtl="0" eaLnBrk="1" fontAlgn="auto" latinLnBrk="0" hangingPunct="1">
+              <a:lnSpc>
+                <a:spcPct val="100000"/>
+              </a:lnSpc>
+              <a:spcBef>
+                <a:spcPts val="0"/>
+              </a:spcBef>
+              <a:spcAft>
+                <a:spcPts val="0"/>
+              </a:spcAft>
+              <a:buClrTx/>
+              <a:buSzTx/>
+              <a:buFontTx/>
+              <a:buNone/>
+              <a:tabLst/>
+              <a:defRPr/>
+            </a:pPr>
+            <a:r>
+              <a:rPr lang="en-US" sz="1200" b="1" dirty="0"/>
+              <a:t>Parse HTML Code With Beautiful Soup</a:t>
+            </a:r>
+            <a:endParaRPr lang="en-US" dirty="0"/>
+          </a:p>
+          <a:p>
+            <a:r>
+              <a:rPr lang="en-US" dirty="0">
+                <a:hlinkClick r:id="rId3"/>
+              </a:rPr>
+              <a:t>Beautiful Soup</a:t>
+            </a:r>
+            <a:r>
+              <a:rPr lang="en-US" dirty="0"/>
+              <a:t> is a Python library for </a:t>
+            </a:r>
+            <a:r>
+              <a:rPr lang="en-US" b="1" dirty="0"/>
+              <a:t>parsing structured data</a:t>
+            </a:r>
+            <a:r>
+              <a:rPr lang="en-US" dirty="0"/>
+              <a:t>. It allows you to interact with HTML in a similar way to how you interact with a web page using developer tools</a:t>
+            </a:r>
+          </a:p>
+        </p:txBody>
+      </p:sp>
+      <p:sp>
+        <p:nvSpPr>
+          <p:cNvPr id="4" name="Slide Number Placeholder 3"/>
+          <p:cNvSpPr>
+            <a:spLocks noGrp="1"/>
+          </p:cNvSpPr>
+          <p:nvPr>
+            <p:ph type="sldNum" sz="quarter" idx="5"/>
+          </p:nvPr>
+        </p:nvSpPr>
+        <p:spPr/>
+        <p:txBody>
+          <a:bodyPr/>
+          <a:lstStyle/>
+          <a:p>
+            <a:fld id="{941248EB-719A-B944-B3C9-708649C4FE49}" type="slidenum">
+              <a:rPr lang="en-US" smtClean="0"/>
+              <a:t>7</a:t>
+            </a:fld>
+            <a:endParaRPr lang="en-US"/>
+          </a:p>
+        </p:txBody>
+      </p:sp>
+    </p:spTree>
+    <p:extLst>
+      <p:ext uri="{BB962C8B-B14F-4D97-AF65-F5344CB8AC3E}">
+        <p14:creationId xmlns:p14="http://schemas.microsoft.com/office/powerpoint/2010/main" val="3526116269"/>
+      </p:ext>
+    </p:extLst>
+  </p:cSld>
+  <p:clrMapOvr>
+    <a:masterClrMapping/>
+  </p:clrMapOvr>
+</p:notes>
+</file>
+
 <file path=ppt/slideLayouts/slideLayout1.xml><?xml version="1.0" encoding="utf-8"?>
 <p:sldLayout xmlns:a="http://schemas.openxmlformats.org/drawingml/2006/main" xmlns:r="http://schemas.openxmlformats.org/officeDocument/2006/relationships" xmlns:p="http://schemas.openxmlformats.org/presentationml/2006/main" type="title" preserve="1">
   <p:cSld name="Title Slide">
@@ -268,7 +930,7 @@
           <a:p>
             <a:fld id="{3C5E3940-567D-0E4A-B27A-538E5CA3F251}" type="datetimeFigureOut">
               <a:rPr lang="en-US" smtClean="0"/>
-              <a:t>11/18/22</a:t>
+              <a:t>11/21/22</a:t>
             </a:fld>
             <a:endParaRPr lang="en-US"/>
           </a:p>
@@ -466,7 +1128,7 @@
           <a:p>
             <a:fld id="{3C5E3940-567D-0E4A-B27A-538E5CA3F251}" type="datetimeFigureOut">
               <a:rPr lang="en-US" smtClean="0"/>
-              <a:t>11/18/22</a:t>
+              <a:t>11/21/22</a:t>
             </a:fld>
             <a:endParaRPr lang="en-US"/>
           </a:p>
@@ -674,7 +1336,7 @@
           <a:p>
             <a:fld id="{3C5E3940-567D-0E4A-B27A-538E5CA3F251}" type="datetimeFigureOut">
               <a:rPr lang="en-US" smtClean="0"/>
-              <a:t>11/18/22</a:t>
+              <a:t>11/21/22</a:t>
             </a:fld>
             <a:endParaRPr lang="en-US"/>
           </a:p>
@@ -872,7 +1534,7 @@
           <a:p>
             <a:fld id="{3C5E3940-567D-0E4A-B27A-538E5CA3F251}" type="datetimeFigureOut">
               <a:rPr lang="en-US" smtClean="0"/>
-              <a:t>11/18/22</a:t>
+              <a:t>11/21/22</a:t>
             </a:fld>
             <a:endParaRPr lang="en-US"/>
           </a:p>
@@ -1147,7 +1809,7 @@
           <a:p>
             <a:fld id="{3C5E3940-567D-0E4A-B27A-538E5CA3F251}" type="datetimeFigureOut">
               <a:rPr lang="en-US" smtClean="0"/>
-              <a:t>11/18/22</a:t>
+              <a:t>11/21/22</a:t>
             </a:fld>
             <a:endParaRPr lang="en-US"/>
           </a:p>
@@ -1412,7 +2074,7 @@
           <a:p>
             <a:fld id="{3C5E3940-567D-0E4A-B27A-538E5CA3F251}" type="datetimeFigureOut">
               <a:rPr lang="en-US" smtClean="0"/>
-              <a:t>11/18/22</a:t>
+              <a:t>11/21/22</a:t>
             </a:fld>
             <a:endParaRPr lang="en-US"/>
           </a:p>
@@ -1824,7 +2486,7 @@
           <a:p>
             <a:fld id="{3C5E3940-567D-0E4A-B27A-538E5CA3F251}" type="datetimeFigureOut">
               <a:rPr lang="en-US" smtClean="0"/>
-              <a:t>11/18/22</a:t>
+              <a:t>11/21/22</a:t>
             </a:fld>
             <a:endParaRPr lang="en-US"/>
           </a:p>
@@ -1965,7 +2627,7 @@
           <a:p>
             <a:fld id="{3C5E3940-567D-0E4A-B27A-538E5CA3F251}" type="datetimeFigureOut">
               <a:rPr lang="en-US" smtClean="0"/>
-              <a:t>11/18/22</a:t>
+              <a:t>11/21/22</a:t>
             </a:fld>
             <a:endParaRPr lang="en-US"/>
           </a:p>
@@ -2078,7 +2740,7 @@
           <a:p>
             <a:fld id="{3C5E3940-567D-0E4A-B27A-538E5CA3F251}" type="datetimeFigureOut">
               <a:rPr lang="en-US" smtClean="0"/>
-              <a:t>11/18/22</a:t>
+              <a:t>11/21/22</a:t>
             </a:fld>
             <a:endParaRPr lang="en-US"/>
           </a:p>
@@ -2389,7 +3051,7 @@
           <a:p>
             <a:fld id="{3C5E3940-567D-0E4A-B27A-538E5CA3F251}" type="datetimeFigureOut">
               <a:rPr lang="en-US" smtClean="0"/>
-              <a:t>11/18/22</a:t>
+              <a:t>11/21/22</a:t>
             </a:fld>
             <a:endParaRPr lang="en-US"/>
           </a:p>
@@ -2677,7 +3339,7 @@
           <a:p>
             <a:fld id="{3C5E3940-567D-0E4A-B27A-538E5CA3F251}" type="datetimeFigureOut">
               <a:rPr lang="en-US" smtClean="0"/>
-              <a:t>11/18/22</a:t>
+              <a:t>11/21/22</a:t>
             </a:fld>
             <a:endParaRPr lang="en-US"/>
           </a:p>
@@ -2918,7 +3580,7 @@
           <a:p>
             <a:fld id="{3C5E3940-567D-0E4A-B27A-538E5CA3F251}" type="datetimeFigureOut">
               <a:rPr lang="en-US" smtClean="0"/>
-              <a:t>11/18/22</a:t>
+              <a:t>11/21/22</a:t>
             </a:fld>
             <a:endParaRPr lang="en-US"/>
           </a:p>
@@ -3455,6 +4117,350 @@
           <p:cNvPr id="2" name="Title 1">
             <a:extLst>
               <a:ext uri="{FF2B5EF4-FFF2-40B4-BE49-F238E27FC236}">
+                <a16:creationId xmlns:a16="http://schemas.microsoft.com/office/drawing/2014/main" id="{D56A079E-9CD9-D84F-AC45-14A954F929FD}"/>
+              </a:ext>
+            </a:extLst>
+          </p:cNvPr>
+          <p:cNvSpPr>
+            <a:spLocks noGrp="1"/>
+          </p:cNvSpPr>
+          <p:nvPr>
+            <p:ph type="title"/>
+          </p:nvPr>
+        </p:nvSpPr>
+        <p:spPr/>
+        <p:txBody>
+          <a:bodyPr/>
+          <a:lstStyle/>
+          <a:p>
+            <a:r>
+              <a:rPr lang="en-US" dirty="0"/>
+              <a:t>Discussion of Access Rights</a:t>
+            </a:r>
+          </a:p>
+        </p:txBody>
+      </p:sp>
+      <p:sp>
+        <p:nvSpPr>
+          <p:cNvPr id="3" name="Content Placeholder 2">
+            <a:extLst>
+              <a:ext uri="{FF2B5EF4-FFF2-40B4-BE49-F238E27FC236}">
+                <a16:creationId xmlns:a16="http://schemas.microsoft.com/office/drawing/2014/main" id="{D83F7FD3-C115-7C41-AA01-0FEA687163C6}"/>
+              </a:ext>
+            </a:extLst>
+          </p:cNvPr>
+          <p:cNvSpPr>
+            <a:spLocks noGrp="1"/>
+          </p:cNvSpPr>
+          <p:nvPr>
+            <p:ph idx="1"/>
+          </p:nvPr>
+        </p:nvSpPr>
+        <p:spPr/>
+        <p:txBody>
+          <a:bodyPr>
+            <a:normAutofit/>
+          </a:bodyPr>
+          <a:lstStyle/>
+          <a:p>
+            <a:pPr marL="0" indent="0">
+              <a:buNone/>
+            </a:pPr>
+            <a:r>
+              <a:rPr lang="en-US" b="0" dirty="0">
+                <a:solidFill>
+                  <a:srgbClr val="0070C0"/>
+                </a:solidFill>
+                <a:effectLst/>
+              </a:rPr>
+              <a:t>Spotify Web API</a:t>
+            </a:r>
+            <a:r>
+              <a:rPr lang="en-US" b="0" dirty="0">
+                <a:effectLst/>
+              </a:rPr>
+              <a:t>:</a:t>
+            </a:r>
+          </a:p>
+          <a:p>
+            <a:r>
+              <a:rPr lang="en-US" b="0" dirty="0">
+                <a:effectLst/>
+              </a:rPr>
+              <a:t>In order to make successful Web API requests, we need a valid access token obtained through OAuth 2.0.</a:t>
+            </a:r>
+          </a:p>
+          <a:p>
+            <a:endParaRPr lang="en-US" dirty="0"/>
+          </a:p>
+          <a:p>
+            <a:pPr marL="0" indent="0">
+              <a:buNone/>
+            </a:pPr>
+            <a:r>
+              <a:rPr lang="en-US" b="0" dirty="0" err="1">
+                <a:solidFill>
+                  <a:srgbClr val="0070C0"/>
+                </a:solidFill>
+                <a:effectLst/>
+              </a:rPr>
+              <a:t>Musixmatch</a:t>
+            </a:r>
+            <a:r>
+              <a:rPr lang="en-US" b="0" dirty="0">
+                <a:effectLst/>
+              </a:rPr>
+              <a:t>: </a:t>
+            </a:r>
+          </a:p>
+          <a:p>
+            <a:r>
+              <a:rPr lang="en-US" b="0" dirty="0">
+                <a:effectLst/>
+              </a:rPr>
+              <a:t>offer our large-scale lyrics dataset designed to allow machine learning companies and researchers use a wide range of applications like lyrics text analysis which creates music recommendations and provides insights.</a:t>
+            </a:r>
+          </a:p>
+          <a:p>
+            <a:endParaRPr lang="en-US" dirty="0"/>
+          </a:p>
+        </p:txBody>
+      </p:sp>
+    </p:spTree>
+    <p:extLst>
+      <p:ext uri="{BB962C8B-B14F-4D97-AF65-F5344CB8AC3E}">
+        <p14:creationId xmlns:p14="http://schemas.microsoft.com/office/powerpoint/2010/main" val="3288101558"/>
+      </p:ext>
+    </p:extLst>
+  </p:cSld>
+  <p:clrMapOvr>
+    <a:masterClrMapping/>
+  </p:clrMapOvr>
+</p:sld>
+</file>
+
+<file path=ppt/slides/slide11.xml><?xml version="1.0" encoding="utf-8"?>
+<p:sld xmlns:a="http://schemas.openxmlformats.org/drawingml/2006/main" xmlns:r="http://schemas.openxmlformats.org/officeDocument/2006/relationships" xmlns:p="http://schemas.openxmlformats.org/presentationml/2006/main">
+  <p:cSld>
+    <p:spTree>
+      <p:nvGrpSpPr>
+        <p:cNvPr id="1" name=""/>
+        <p:cNvGrpSpPr/>
+        <p:nvPr/>
+      </p:nvGrpSpPr>
+      <p:grpSpPr>
+        <a:xfrm>
+          <a:off x="0" y="0"/>
+          <a:ext cx="0" cy="0"/>
+          <a:chOff x="0" y="0"/>
+          <a:chExt cx="0" cy="0"/>
+        </a:xfrm>
+      </p:grpSpPr>
+      <p:sp>
+        <p:nvSpPr>
+          <p:cNvPr id="2" name="Title 1">
+            <a:extLst>
+              <a:ext uri="{FF2B5EF4-FFF2-40B4-BE49-F238E27FC236}">
+                <a16:creationId xmlns:a16="http://schemas.microsoft.com/office/drawing/2014/main" id="{8B337B21-1E26-A847-AC61-FDA5EEFBFA48}"/>
+              </a:ext>
+            </a:extLst>
+          </p:cNvPr>
+          <p:cNvSpPr>
+            <a:spLocks noGrp="1"/>
+          </p:cNvSpPr>
+          <p:nvPr>
+            <p:ph type="title"/>
+          </p:nvPr>
+        </p:nvSpPr>
+        <p:spPr/>
+        <p:txBody>
+          <a:bodyPr/>
+          <a:lstStyle/>
+          <a:p>
+            <a:r>
+              <a:rPr lang="en-US" dirty="0"/>
+              <a:t>Issues and Limitations</a:t>
+            </a:r>
+          </a:p>
+        </p:txBody>
+      </p:sp>
+      <p:sp>
+        <p:nvSpPr>
+          <p:cNvPr id="3" name="Content Placeholder 2">
+            <a:extLst>
+              <a:ext uri="{FF2B5EF4-FFF2-40B4-BE49-F238E27FC236}">
+                <a16:creationId xmlns:a16="http://schemas.microsoft.com/office/drawing/2014/main" id="{7A6681F8-49AF-094B-8AE8-6157C5F0B6F6}"/>
+              </a:ext>
+            </a:extLst>
+          </p:cNvPr>
+          <p:cNvSpPr>
+            <a:spLocks noGrp="1"/>
+          </p:cNvSpPr>
+          <p:nvPr>
+            <p:ph idx="1"/>
+          </p:nvPr>
+        </p:nvSpPr>
+        <p:spPr/>
+        <p:txBody>
+          <a:bodyPr/>
+          <a:lstStyle/>
+          <a:p>
+            <a:pPr marL="0" indent="0">
+              <a:buNone/>
+            </a:pPr>
+            <a:r>
+              <a:rPr lang="en-US" sz="2400" dirty="0">
+                <a:solidFill>
+                  <a:schemeClr val="accent1"/>
+                </a:solidFill>
+              </a:rPr>
+              <a:t>Spotify</a:t>
+            </a:r>
+            <a:r>
+              <a:rPr lang="en-US" sz="1800" dirty="0"/>
+              <a:t>: </a:t>
+            </a:r>
+          </a:p>
+          <a:p>
+            <a:pPr lvl="1"/>
+            <a:r>
+              <a:rPr lang="en-US" sz="1800" b="0" dirty="0">
+                <a:effectLst/>
+              </a:rPr>
+              <a:t>In order to make successful Web API requests your app will need a valid access token. One can be obtained through OAuth 2.0.</a:t>
+            </a:r>
+          </a:p>
+          <a:p>
+            <a:pPr lvl="1"/>
+            <a:endParaRPr lang="en-US" sz="1800" b="0" dirty="0">
+              <a:effectLst/>
+            </a:endParaRPr>
+          </a:p>
+          <a:p>
+            <a:pPr marL="0" indent="0">
+              <a:buNone/>
+            </a:pPr>
+            <a:r>
+              <a:rPr lang="en-US" sz="2400" b="0" i="1" dirty="0" err="1">
+                <a:solidFill>
+                  <a:srgbClr val="0070C0"/>
+                </a:solidFill>
+                <a:effectLst/>
+              </a:rPr>
+              <a:t>Musixmatch</a:t>
+            </a:r>
+            <a:r>
+              <a:rPr lang="en-US" sz="1800" b="0" i="1" dirty="0">
+                <a:effectLst/>
+              </a:rPr>
+              <a:t>:</a:t>
+            </a:r>
+          </a:p>
+          <a:p>
+            <a:pPr lvl="1"/>
+            <a:r>
+              <a:rPr lang="en-US" sz="1800" b="0" i="1" dirty="0">
+                <a:effectLst/>
+              </a:rPr>
+              <a:t>Free</a:t>
+            </a:r>
+            <a:endParaRPr lang="en-US" sz="1800" b="0" dirty="0">
+              <a:effectLst/>
+            </a:endParaRPr>
+          </a:p>
+          <a:p>
+            <a:pPr lvl="1"/>
+            <a:r>
+              <a:rPr lang="en-US" sz="1800" b="0" i="1" dirty="0">
+                <a:effectLst/>
+              </a:rPr>
+              <a:t>Limited to 2k API Calls daily</a:t>
+            </a:r>
+            <a:endParaRPr lang="en-US" sz="1800" b="0" dirty="0">
+              <a:effectLst/>
+            </a:endParaRPr>
+          </a:p>
+          <a:p>
+            <a:pPr lvl="1"/>
+            <a:r>
+              <a:rPr lang="en-US" sz="1800" b="0" i="1" dirty="0">
+                <a:effectLst/>
+              </a:rPr>
+              <a:t>Free testing plan for evaluation only</a:t>
+            </a:r>
+            <a:endParaRPr lang="en-US" sz="1800" b="0" dirty="0">
+              <a:effectLst/>
+            </a:endParaRPr>
+          </a:p>
+          <a:p>
+            <a:pPr lvl="1"/>
+            <a:r>
+              <a:rPr lang="en-US" sz="1800" b="0" i="1" dirty="0">
+                <a:effectLst/>
+              </a:rPr>
+              <a:t>Access to ONLY 30% of lyrics per song</a:t>
+            </a:r>
+            <a:endParaRPr lang="en-US" sz="1800" b="0" dirty="0">
+              <a:effectLst/>
+            </a:endParaRPr>
+          </a:p>
+          <a:p>
+            <a:pPr lvl="1"/>
+            <a:r>
+              <a:rPr lang="en-US" sz="1800" b="0" i="1" dirty="0">
+                <a:effectLst/>
+              </a:rPr>
+              <a:t>Understanding which part of the song (beginning, middle, end) contains the lyrics that are needed to be best analyzed for our dataset.</a:t>
+            </a:r>
+            <a:endParaRPr lang="en-US" sz="1800" b="0" dirty="0">
+              <a:effectLst/>
+            </a:endParaRPr>
+          </a:p>
+          <a:p>
+            <a:endParaRPr lang="en-US" sz="2400" b="0" dirty="0">
+              <a:effectLst/>
+            </a:endParaRPr>
+          </a:p>
+          <a:p>
+            <a:endParaRPr lang="en-US" dirty="0"/>
+          </a:p>
+        </p:txBody>
+      </p:sp>
+    </p:spTree>
+    <p:extLst>
+      <p:ext uri="{BB962C8B-B14F-4D97-AF65-F5344CB8AC3E}">
+        <p14:creationId xmlns:p14="http://schemas.microsoft.com/office/powerpoint/2010/main" val="2645747481"/>
+      </p:ext>
+    </p:extLst>
+  </p:cSld>
+  <p:clrMapOvr>
+    <a:masterClrMapping/>
+  </p:clrMapOvr>
+</p:sld>
+</file>
+
+<file path=ppt/slides/slide12.xml><?xml version="1.0" encoding="utf-8"?>
+<p:sld xmlns:a="http://schemas.openxmlformats.org/drawingml/2006/main" xmlns:r="http://schemas.openxmlformats.org/officeDocument/2006/relationships" xmlns:p="http://schemas.openxmlformats.org/presentationml/2006/main">
+  <p:cSld>
+    <p:spTree>
+      <p:nvGrpSpPr>
+        <p:cNvPr id="1" name=""/>
+        <p:cNvGrpSpPr/>
+        <p:nvPr/>
+      </p:nvGrpSpPr>
+      <p:grpSpPr>
+        <a:xfrm>
+          <a:off x="0" y="0"/>
+          <a:ext cx="0" cy="0"/>
+          <a:chOff x="0" y="0"/>
+          <a:chExt cx="0" cy="0"/>
+        </a:xfrm>
+      </p:grpSpPr>
+      <p:sp>
+        <p:nvSpPr>
+          <p:cNvPr id="2" name="Title 1">
+            <a:extLst>
+              <a:ext uri="{FF2B5EF4-FFF2-40B4-BE49-F238E27FC236}">
                 <a16:creationId xmlns:a16="http://schemas.microsoft.com/office/drawing/2014/main" id="{5B479FCD-BFB8-A542-BFAA-4C03B0C72546}"/>
               </a:ext>
             </a:extLst>
@@ -3500,9 +4506,88 @@
           <a:lstStyle/>
           <a:p>
             <a:r>
+              <a:rPr lang="en-US" sz="2800" b="0" dirty="0">
+                <a:effectLst/>
+              </a:rPr>
+              <a:t>Harsh </a:t>
+            </a:r>
+            <a:r>
+              <a:rPr lang="en-US" sz="2800" b="0" dirty="0" err="1">
+                <a:effectLst/>
+              </a:rPr>
+              <a:t>Bolakani</a:t>
+            </a:r>
+            <a:endParaRPr lang="en-US" sz="2800" b="0" dirty="0">
+              <a:effectLst/>
+            </a:endParaRPr>
+          </a:p>
+          <a:p>
+            <a:pPr lvl="1"/>
+            <a:r>
               <a:rPr lang="en-US" dirty="0"/>
-              <a:t>List each team member and their contributions to the project</a:t>
-            </a:r>
+              <a:t>Words…</a:t>
+            </a:r>
+          </a:p>
+          <a:p>
+            <a:pPr lvl="1"/>
+            <a:r>
+              <a:rPr lang="en-US" dirty="0"/>
+              <a:t>Words…</a:t>
+            </a:r>
+            <a:endParaRPr lang="en-US" b="0" dirty="0">
+              <a:effectLst/>
+            </a:endParaRPr>
+          </a:p>
+          <a:p>
+            <a:r>
+              <a:rPr lang="en-US" sz="2800" b="0" dirty="0">
+                <a:effectLst/>
+              </a:rPr>
+              <a:t>Greg Morgan</a:t>
+            </a:r>
+          </a:p>
+          <a:p>
+            <a:pPr lvl="1"/>
+            <a:r>
+              <a:rPr lang="en-US" dirty="0"/>
+              <a:t>Words…</a:t>
+            </a:r>
+          </a:p>
+          <a:p>
+            <a:pPr lvl="1"/>
+            <a:r>
+              <a:rPr lang="en-US" dirty="0"/>
+              <a:t>Words…</a:t>
+            </a:r>
+            <a:endParaRPr lang="en-US" b="0" dirty="0">
+              <a:effectLst/>
+            </a:endParaRPr>
+          </a:p>
+          <a:p>
+            <a:r>
+              <a:rPr lang="en-US" sz="2800" b="0" dirty="0">
+                <a:effectLst/>
+              </a:rPr>
+              <a:t>Trevor Pawlewicz</a:t>
+            </a:r>
+          </a:p>
+          <a:p>
+            <a:pPr lvl="1"/>
+            <a:r>
+              <a:rPr lang="en-US" dirty="0"/>
+              <a:t>Words…</a:t>
+            </a:r>
+          </a:p>
+          <a:p>
+            <a:pPr lvl="1"/>
+            <a:r>
+              <a:rPr lang="en-US" dirty="0"/>
+              <a:t>Words…</a:t>
+            </a:r>
+          </a:p>
+          <a:p>
+            <a:pPr lvl="1"/>
+            <a:endParaRPr lang="en-US" dirty="0"/>
           </a:p>
         </p:txBody>
       </p:sp>
@@ -4236,7 +5321,7 @@
           <a:p>
             <a:r>
               <a:rPr lang="en-US" dirty="0"/>
-              <a:t>Approach to Acquiring the Data</a:t>
+              <a:t>Approach to Acquiring the Data: API</a:t>
             </a:r>
           </a:p>
         </p:txBody>
@@ -4276,15 +5361,11 @@
               </a:rPr>
               <a:t>Leverage Spotify API + Genius Lyrics for Data Science Tasks in Python </a:t>
             </a:r>
-            <a:r>
-              <a:rPr lang="en-US" sz="2000" i="0" u="none" strike="noStrike" dirty="0">
-                <a:solidFill>
-                  <a:srgbClr val="292929"/>
-                </a:solidFill>
-                <a:effectLst/>
-              </a:rPr>
-              <a:t>(Example)</a:t>
-            </a:r>
+            <a:endParaRPr lang="en-US" sz="2000" b="0" dirty="0">
+              <a:solidFill>
+                <a:srgbClr val="292929"/>
+              </a:solidFill>
+            </a:endParaRPr>
           </a:p>
           <a:p>
             <a:r>
@@ -4504,7 +5585,7 @@
           <p:cNvPr id="2" name="Title 1">
             <a:extLst>
               <a:ext uri="{FF2B5EF4-FFF2-40B4-BE49-F238E27FC236}">
-                <a16:creationId xmlns:a16="http://schemas.microsoft.com/office/drawing/2014/main" id="{E312C33B-C395-284A-8535-98395D1F6E71}"/>
+                <a16:creationId xmlns:a16="http://schemas.microsoft.com/office/drawing/2014/main" id="{FCCC1219-0C6D-034C-B5AE-66B28FE2AF5A}"/>
               </a:ext>
             </a:extLst>
           </p:cNvPr>
@@ -4522,7 +5603,11 @@
           <a:p>
             <a:r>
               <a:rPr lang="en-US" dirty="0"/>
-              <a:t>Approach to Preprocessing Data</a:t>
+              <a:t>Approach to Acquiring the Data: </a:t>
+            </a:r>
+            <a:r>
+              <a:rPr lang="en-US" sz="4000" dirty="0"/>
+              <a:t>Web Scraping</a:t>
             </a:r>
           </a:p>
         </p:txBody>
@@ -4532,7 +5617,7 @@
           <p:cNvPr id="3" name="Content Placeholder 2">
             <a:extLst>
               <a:ext uri="{FF2B5EF4-FFF2-40B4-BE49-F238E27FC236}">
-                <a16:creationId xmlns:a16="http://schemas.microsoft.com/office/drawing/2014/main" id="{F55CFF0D-D572-3142-A36C-5EE8C0B06137}"/>
+                <a16:creationId xmlns:a16="http://schemas.microsoft.com/office/drawing/2014/main" id="{39B174FE-6367-5942-A419-22ADA79CE723}"/>
               </a:ext>
             </a:extLst>
           </p:cNvPr>
@@ -4543,117 +5628,130 @@
             <p:ph idx="1"/>
           </p:nvPr>
         </p:nvSpPr>
-        <p:spPr/>
+        <p:spPr>
+          <a:xfrm>
+            <a:off x="746235" y="1825625"/>
+            <a:ext cx="10752082" cy="4351338"/>
+          </a:xfrm>
+        </p:spPr>
         <p:txBody>
           <a:bodyPr>
-            <a:normAutofit/>
+            <a:normAutofit lnSpcReduction="10000"/>
           </a:bodyPr>
           <a:lstStyle/>
           <a:p>
-            <a:pPr marL="457200" indent="-457200">
-              <a:buFont typeface="+mj-lt"/>
-              <a:buAutoNum type="arabicPeriod"/>
+            <a:pPr marL="0" indent="0">
+              <a:buNone/>
             </a:pPr>
             <a:r>
-              <a:rPr lang="en-US" sz="2400" b="0" dirty="0">
-                <a:effectLst/>
-              </a:rPr>
-              <a:t>get a list of tracks from </a:t>
-            </a:r>
-            <a:r>
-              <a:rPr lang="en-US" sz="2400" b="0" dirty="0" err="1">
-                <a:effectLst/>
-              </a:rPr>
-              <a:t>musix</a:t>
-            </a:r>
-            <a:r>
-              <a:rPr lang="en-US" sz="2400" b="0" dirty="0">
-                <a:effectLst/>
-              </a:rPr>
-              <a:t> match.</a:t>
-            </a:r>
-          </a:p>
-          <a:p>
-            <a:pPr marL="457200" indent="-457200">
-              <a:buFont typeface="+mj-lt"/>
-              <a:buAutoNum type="arabicPeriod"/>
+              <a:rPr lang="en-US" sz="1400" b="1" dirty="0"/>
+              <a:t>Web scraping</a:t>
+            </a:r>
+            <a:r>
+              <a:rPr lang="en-US" sz="1400" dirty="0"/>
+              <a:t> is the process of gathering information from the Internet. Even copying and pasting the lyrics of your favorite song is a form of web scraping!</a:t>
+            </a:r>
+            <a:endParaRPr lang="en-US" sz="1400" b="1" dirty="0">
+              <a:solidFill>
+                <a:srgbClr val="292929"/>
+              </a:solidFill>
+            </a:endParaRPr>
+          </a:p>
+          <a:p>
+            <a:pPr marL="0" indent="0">
+              <a:buNone/>
             </a:pPr>
             <a:r>
-              <a:rPr lang="en-US" sz="2400" b="0" dirty="0">
-                <a:effectLst/>
-              </a:rPr>
-              <a:t>acquire the lyrics data for those tracks (either from API or scrapping). </a:t>
-            </a:r>
-          </a:p>
-          <a:p>
-            <a:pPr marL="457200" indent="-457200">
-              <a:buFont typeface="+mj-lt"/>
-              <a:buAutoNum type="arabicPeriod"/>
+              <a:rPr lang="en-US" sz="2400" b="1" dirty="0"/>
+              <a:t>Step 1: Inspect Your Data Source (Explore the Website)</a:t>
+            </a:r>
+          </a:p>
+          <a:p>
+            <a:r>
+              <a:rPr lang="en-US" sz="1600" dirty="0"/>
+              <a:t>Understand the site structure to extract the information that’s relevant for you.</a:t>
+            </a:r>
+          </a:p>
+          <a:p>
+            <a:r>
+              <a:rPr lang="en-US" sz="1600" dirty="0"/>
+              <a:t>Decipher the Information in URLs</a:t>
+            </a:r>
+          </a:p>
+          <a:p>
+            <a:r>
+              <a:rPr lang="en-US" sz="1700" dirty="0"/>
+              <a:t>Inspect the Site Using Developer Tools</a:t>
+            </a:r>
+            <a:endParaRPr lang="en-US" sz="1600" dirty="0"/>
+          </a:p>
+          <a:p>
+            <a:pPr marL="0" indent="0">
+              <a:buNone/>
             </a:pPr>
             <a:r>
-              <a:rPr lang="en-US" sz="2400" b="0" dirty="0">
-                <a:effectLst/>
-              </a:rPr>
-              <a:t>acquire the mood data for each track. </a:t>
-            </a:r>
-          </a:p>
-          <a:p>
-            <a:pPr marL="457200" indent="-457200">
-              <a:buFont typeface="+mj-lt"/>
-              <a:buAutoNum type="arabicPeriod"/>
+              <a:rPr lang="en-US" sz="2400" b="1" dirty="0"/>
+              <a:t>Step 2: Scrape HTML Content From a Page</a:t>
+            </a:r>
+          </a:p>
+          <a:p>
+            <a:r>
+              <a:rPr lang="en-US" sz="1600" dirty="0"/>
+              <a:t>Find Elements by HTML class name</a:t>
+            </a:r>
+            <a:endParaRPr lang="en-US" sz="2400" dirty="0"/>
+          </a:p>
+          <a:p>
+            <a:pPr marL="0" indent="0">
+              <a:buNone/>
             </a:pPr>
             <a:r>
-              <a:rPr lang="en-US" sz="2400" b="0" dirty="0">
-                <a:effectLst/>
-              </a:rPr>
-              <a:t>for each track count the words. </a:t>
-            </a:r>
-          </a:p>
-          <a:p>
-            <a:pPr marL="457200" indent="-457200">
-              <a:buFont typeface="+mj-lt"/>
-              <a:buAutoNum type="arabicPeriod"/>
+              <a:rPr lang="en-US" sz="2400" b="1" dirty="0"/>
+              <a:t>Step 3: Parse HTML Code With Beautiful Soup</a:t>
+            </a:r>
+          </a:p>
+          <a:p>
+            <a:r>
+              <a:rPr lang="en-US" sz="1600" dirty="0"/>
+              <a:t>Find Elements and extract by ID, class name, …</a:t>
+            </a:r>
+          </a:p>
+          <a:p>
+            <a:r>
+              <a:rPr lang="en-US" sz="1600" dirty="0"/>
+              <a:t>Extract Text From HTML Elements</a:t>
+            </a:r>
+          </a:p>
+          <a:p>
+            <a:r>
+              <a:rPr lang="en-US" sz="1600" dirty="0"/>
+              <a:t>Pass a Function to a Beautiful Soup Method</a:t>
+            </a:r>
+          </a:p>
+          <a:p>
+            <a:pPr marL="0" indent="0">
+              <a:buNone/>
             </a:pPr>
             <a:r>
-              <a:rPr lang="en-US" sz="2400" b="0" dirty="0">
-                <a:effectLst/>
-              </a:rPr>
-              <a:t>assign to the word counts to a mood based on the mood of the track.</a:t>
-            </a:r>
-          </a:p>
-          <a:p>
-            <a:pPr marL="457200" indent="-457200">
-              <a:buFont typeface="+mj-lt"/>
-              <a:buAutoNum type="arabicPeriod"/>
+              <a:rPr lang="en-US" sz="1300" dirty="0">
+                <a:hlinkClick r:id="rId3"/>
+              </a:rPr>
+              <a:t>https://realpython.com/beautiful-soup-web-scraper-python/#step-1-inspect-your-data-source</a:t>
+            </a:r>
+            <a:endParaRPr lang="en-US" sz="1300" dirty="0"/>
+          </a:p>
+          <a:p>
+            <a:pPr marL="0" indent="0">
+              <a:buNone/>
             </a:pPr>
-            <a:r>
-              <a:rPr lang="en-US" sz="2400" b="0" dirty="0">
-                <a:effectLst/>
-              </a:rPr>
-              <a:t>order the words for each mood based on count.</a:t>
-            </a:r>
-          </a:p>
-          <a:p>
-            <a:pPr marL="457200" indent="-457200">
-              <a:buFont typeface="+mj-lt"/>
-              <a:buAutoNum type="arabicPeriod"/>
-            </a:pPr>
-            <a:r>
-              <a:rPr lang="en-US" sz="2400" b="0" dirty="0">
-                <a:effectLst/>
-              </a:rPr>
-              <a:t>output finalized dataset to a file.</a:t>
-            </a:r>
-          </a:p>
-          <a:p>
-            <a:endParaRPr lang="en-US" sz="2400" dirty="0"/>
+            <a:endParaRPr lang="en-US" dirty="0"/>
           </a:p>
         </p:txBody>
       </p:sp>
     </p:spTree>
     <p:extLst>
       <p:ext uri="{BB962C8B-B14F-4D97-AF65-F5344CB8AC3E}">
-        <p14:creationId xmlns:p14="http://schemas.microsoft.com/office/powerpoint/2010/main" val="1612097646"/>
+        <p14:creationId xmlns:p14="http://schemas.microsoft.com/office/powerpoint/2010/main" val="2604059689"/>
       </p:ext>
     </p:extLst>
   </p:cSld>
@@ -4685,7 +5783,7 @@
           <p:cNvPr id="2" name="Title 1">
             <a:extLst>
               <a:ext uri="{FF2B5EF4-FFF2-40B4-BE49-F238E27FC236}">
-                <a16:creationId xmlns:a16="http://schemas.microsoft.com/office/drawing/2014/main" id="{F54CD119-5868-0A44-B523-6F9234BC943E}"/>
+                <a16:creationId xmlns:a16="http://schemas.microsoft.com/office/drawing/2014/main" id="{FCCC1219-0C6D-034C-B5AE-66B28FE2AF5A}"/>
               </a:ext>
             </a:extLst>
           </p:cNvPr>
@@ -4703,7 +5801,11 @@
           <a:p>
             <a:r>
               <a:rPr lang="en-US" dirty="0"/>
-              <a:t>Distribution Approach</a:t>
+              <a:t>Approach to Acquiring the Data: </a:t>
+            </a:r>
+            <a:r>
+              <a:rPr lang="en-US" sz="4000" dirty="0"/>
+              <a:t>Web Scraping</a:t>
             </a:r>
           </a:p>
         </p:txBody>
@@ -4713,7 +5815,7 @@
           <p:cNvPr id="3" name="Content Placeholder 2">
             <a:extLst>
               <a:ext uri="{FF2B5EF4-FFF2-40B4-BE49-F238E27FC236}">
-                <a16:creationId xmlns:a16="http://schemas.microsoft.com/office/drawing/2014/main" id="{05E2C9C3-D3B6-134D-A713-56229C7F4D3B}"/>
+                <a16:creationId xmlns:a16="http://schemas.microsoft.com/office/drawing/2014/main" id="{39B174FE-6367-5942-A419-22ADA79CE723}"/>
               </a:ext>
             </a:extLst>
           </p:cNvPr>
@@ -4724,19 +5826,87 @@
             <p:ph idx="1"/>
           </p:nvPr>
         </p:nvSpPr>
-        <p:spPr/>
-        <p:txBody>
-          <a:bodyPr/>
-          <a:lstStyle/>
-          <a:p>
-            <a:endParaRPr lang="en-US"/>
+        <p:spPr>
+          <a:xfrm>
+            <a:off x="746235" y="1825625"/>
+            <a:ext cx="10752082" cy="4351338"/>
+          </a:xfrm>
+        </p:spPr>
+        <p:txBody>
+          <a:bodyPr>
+            <a:normAutofit/>
+          </a:bodyPr>
+          <a:lstStyle/>
+          <a:p>
+            <a:pPr>
+              <a:buFont typeface="+mj-lt"/>
+              <a:buAutoNum type="arabicPeriod"/>
+            </a:pPr>
+            <a:r>
+              <a:rPr lang="en-US" dirty="0"/>
+              <a:t>Fetch the main URL HTML code.</a:t>
+            </a:r>
+          </a:p>
+          <a:p>
+            <a:pPr>
+              <a:buFont typeface="+mj-lt"/>
+              <a:buAutoNum type="arabicPeriod"/>
+            </a:pPr>
+            <a:r>
+              <a:rPr lang="en-US" dirty="0"/>
+              <a:t>Feed that HTML to </a:t>
+            </a:r>
+            <a:r>
+              <a:rPr lang="en-US" dirty="0" err="1"/>
+              <a:t>BeautifulSoup</a:t>
+            </a:r>
+            <a:r>
+              <a:rPr lang="en-US" dirty="0"/>
+              <a:t>.</a:t>
+            </a:r>
+          </a:p>
+          <a:p>
+            <a:pPr>
+              <a:buFont typeface="+mj-lt"/>
+              <a:buAutoNum type="arabicPeriod"/>
+            </a:pPr>
+            <a:r>
+              <a:rPr lang="en-US" dirty="0"/>
+              <a:t>Extract each song from the list and get the wiki link of each book.</a:t>
+            </a:r>
+          </a:p>
+          <a:p>
+            <a:pPr>
+              <a:buFont typeface="+mj-lt"/>
+              <a:buAutoNum type="arabicPeriod"/>
+            </a:pPr>
+            <a:r>
+              <a:rPr lang="en-US" dirty="0"/>
+              <a:t>Obtain lyrical data for each song.</a:t>
+            </a:r>
+          </a:p>
+          <a:p>
+            <a:pPr>
+              <a:buFont typeface="+mj-lt"/>
+              <a:buAutoNum type="arabicPeriod"/>
+            </a:pPr>
+            <a:r>
+              <a:rPr lang="en-US" dirty="0"/>
+              <a:t>Get all songs lyrical data, clean, and plot final results.</a:t>
+            </a:r>
+          </a:p>
+          <a:p>
+            <a:pPr marL="0" indent="0">
+              <a:buNone/>
+            </a:pPr>
+            <a:endParaRPr lang="en-US" dirty="0"/>
           </a:p>
         </p:txBody>
       </p:sp>
     </p:spTree>
     <p:extLst>
       <p:ext uri="{BB962C8B-B14F-4D97-AF65-F5344CB8AC3E}">
-        <p14:creationId xmlns:p14="http://schemas.microsoft.com/office/powerpoint/2010/main" val="2781622621"/>
+        <p14:creationId xmlns:p14="http://schemas.microsoft.com/office/powerpoint/2010/main" val="711782481"/>
       </p:ext>
     </p:extLst>
   </p:cSld>
@@ -4768,7 +5938,7 @@
           <p:cNvPr id="2" name="Title 1">
             <a:extLst>
               <a:ext uri="{FF2B5EF4-FFF2-40B4-BE49-F238E27FC236}">
-                <a16:creationId xmlns:a16="http://schemas.microsoft.com/office/drawing/2014/main" id="{D56A079E-9CD9-D84F-AC45-14A954F929FD}"/>
+                <a16:creationId xmlns:a16="http://schemas.microsoft.com/office/drawing/2014/main" id="{E312C33B-C395-284A-8535-98395D1F6E71}"/>
               </a:ext>
             </a:extLst>
           </p:cNvPr>
@@ -4786,7 +5956,7 @@
           <a:p>
             <a:r>
               <a:rPr lang="en-US" dirty="0"/>
-              <a:t>Discussion of Access Rights</a:t>
+              <a:t>Approach to Preprocessing Data</a:t>
             </a:r>
           </a:p>
         </p:txBody>
@@ -4796,7 +5966,7 @@
           <p:cNvPr id="3" name="Content Placeholder 2">
             <a:extLst>
               <a:ext uri="{FF2B5EF4-FFF2-40B4-BE49-F238E27FC236}">
-                <a16:creationId xmlns:a16="http://schemas.microsoft.com/office/drawing/2014/main" id="{D83F7FD3-C115-7C41-AA01-0FEA687163C6}"/>
+                <a16:creationId xmlns:a16="http://schemas.microsoft.com/office/drawing/2014/main" id="{F55CFF0D-D572-3142-A36C-5EE8C0B06137}"/>
               </a:ext>
             </a:extLst>
           </p:cNvPr>
@@ -4809,17 +5979,115 @@
         </p:nvSpPr>
         <p:spPr/>
         <p:txBody>
-          <a:bodyPr/>
-          <a:lstStyle/>
-          <a:p>
-            <a:endParaRPr lang="en-US"/>
+          <a:bodyPr>
+            <a:normAutofit/>
+          </a:bodyPr>
+          <a:lstStyle/>
+          <a:p>
+            <a:pPr marL="457200" indent="-457200">
+              <a:buFont typeface="+mj-lt"/>
+              <a:buAutoNum type="arabicPeriod"/>
+            </a:pPr>
+            <a:r>
+              <a:rPr lang="en-US" sz="2400" b="0" dirty="0">
+                <a:effectLst/>
+              </a:rPr>
+              <a:t>get a list of tracks from </a:t>
+            </a:r>
+            <a:r>
+              <a:rPr lang="en-US" sz="2400" b="0" dirty="0" err="1">
+                <a:effectLst/>
+              </a:rPr>
+              <a:t>musix</a:t>
+            </a:r>
+            <a:r>
+              <a:rPr lang="en-US" sz="2400" b="0" dirty="0">
+                <a:effectLst/>
+              </a:rPr>
+              <a:t> match.</a:t>
+            </a:r>
+          </a:p>
+          <a:p>
+            <a:pPr marL="457200" indent="-457200">
+              <a:buFont typeface="+mj-lt"/>
+              <a:buAutoNum type="arabicPeriod"/>
+            </a:pPr>
+            <a:r>
+              <a:rPr lang="en-US" sz="2400" b="0" dirty="0">
+                <a:effectLst/>
+              </a:rPr>
+              <a:t>acquire the lyrics data for those tracks (either from API or scrapping). </a:t>
+            </a:r>
+          </a:p>
+          <a:p>
+            <a:pPr marL="457200" indent="-457200">
+              <a:buFont typeface="+mj-lt"/>
+              <a:buAutoNum type="arabicPeriod"/>
+            </a:pPr>
+            <a:r>
+              <a:rPr lang="en-US" sz="2400" b="0" dirty="0">
+                <a:effectLst/>
+              </a:rPr>
+              <a:t>acquire the mood data for each track. </a:t>
+            </a:r>
+          </a:p>
+          <a:p>
+            <a:pPr marL="457200" indent="-457200">
+              <a:buFont typeface="+mj-lt"/>
+              <a:buAutoNum type="arabicPeriod"/>
+            </a:pPr>
+            <a:r>
+              <a:rPr lang="en-US" sz="2400" b="0" dirty="0">
+                <a:effectLst/>
+              </a:rPr>
+              <a:t>for each track count the words. </a:t>
+            </a:r>
+          </a:p>
+          <a:p>
+            <a:pPr marL="457200" indent="-457200">
+              <a:buFont typeface="+mj-lt"/>
+              <a:buAutoNum type="arabicPeriod"/>
+            </a:pPr>
+            <a:r>
+              <a:rPr lang="en-US" sz="2400" b="0" dirty="0">
+                <a:effectLst/>
+              </a:rPr>
+              <a:t>assign to the word counts to a mood based on the mood of the track.</a:t>
+            </a:r>
+          </a:p>
+          <a:p>
+            <a:pPr marL="457200" indent="-457200">
+              <a:buFont typeface="+mj-lt"/>
+              <a:buAutoNum type="arabicPeriod"/>
+            </a:pPr>
+            <a:r>
+              <a:rPr lang="en-US" sz="2400" b="0" dirty="0">
+                <a:effectLst/>
+              </a:rPr>
+              <a:t>order the words for each mood based on count.</a:t>
+            </a:r>
+          </a:p>
+          <a:p>
+            <a:pPr marL="457200" indent="-457200">
+              <a:buFont typeface="+mj-lt"/>
+              <a:buAutoNum type="arabicPeriod"/>
+            </a:pPr>
+            <a:r>
+              <a:rPr lang="en-US" sz="2400" b="0" dirty="0">
+                <a:effectLst/>
+              </a:rPr>
+              <a:t>output finalized dataset to a file.</a:t>
+            </a:r>
+          </a:p>
+          <a:p>
+            <a:endParaRPr lang="en-US" sz="2400" dirty="0"/>
           </a:p>
         </p:txBody>
       </p:sp>
     </p:spTree>
     <p:extLst>
       <p:ext uri="{BB962C8B-B14F-4D97-AF65-F5344CB8AC3E}">
-        <p14:creationId xmlns:p14="http://schemas.microsoft.com/office/powerpoint/2010/main" val="3288101558"/>
+        <p14:creationId xmlns:p14="http://schemas.microsoft.com/office/powerpoint/2010/main" val="1612097646"/>
       </p:ext>
     </p:extLst>
   </p:cSld>
@@ -4851,7 +6119,7 @@
           <p:cNvPr id="2" name="Title 1">
             <a:extLst>
               <a:ext uri="{FF2B5EF4-FFF2-40B4-BE49-F238E27FC236}">
-                <a16:creationId xmlns:a16="http://schemas.microsoft.com/office/drawing/2014/main" id="{8B337B21-1E26-A847-AC61-FDA5EEFBFA48}"/>
+                <a16:creationId xmlns:a16="http://schemas.microsoft.com/office/drawing/2014/main" id="{F54CD119-5868-0A44-B523-6F9234BC943E}"/>
               </a:ext>
             </a:extLst>
           </p:cNvPr>
@@ -4869,7 +6137,7 @@
           <a:p>
             <a:r>
               <a:rPr lang="en-US" dirty="0"/>
-              <a:t>Issues and Limitations</a:t>
+              <a:t>Distribution Approach</a:t>
             </a:r>
           </a:p>
         </p:txBody>
@@ -4879,7 +6147,7 @@
           <p:cNvPr id="3" name="Content Placeholder 2">
             <a:extLst>
               <a:ext uri="{FF2B5EF4-FFF2-40B4-BE49-F238E27FC236}">
-                <a16:creationId xmlns:a16="http://schemas.microsoft.com/office/drawing/2014/main" id="{7A6681F8-49AF-094B-8AE8-6157C5F0B6F6}"/>
+                <a16:creationId xmlns:a16="http://schemas.microsoft.com/office/drawing/2014/main" id="{05E2C9C3-D3B6-134D-A713-56229C7F4D3B}"/>
               </a:ext>
             </a:extLst>
           </p:cNvPr>
@@ -4895,34 +6163,14 @@
           <a:bodyPr/>
           <a:lstStyle/>
           <a:p>
-            <a:r>
-              <a:rPr lang="en-US" sz="2400" dirty="0">
-                <a:solidFill>
-                  <a:schemeClr val="accent1"/>
-                </a:solidFill>
-              </a:rPr>
-              <a:t>Spotify</a:t>
-            </a:r>
-            <a:r>
-              <a:rPr lang="en-US" sz="2400" dirty="0"/>
-              <a:t>: </a:t>
-            </a:r>
-            <a:r>
-              <a:rPr lang="en-US" sz="2400" b="0" dirty="0">
-                <a:effectLst/>
-              </a:rPr>
-              <a:t>In order to make successful Web API requests your app will need a valid access token. One can be obtained through OAuth 2.0.</a:t>
-            </a:r>
-          </a:p>
-          <a:p>
-            <a:endParaRPr lang="en-US" dirty="0"/>
+            <a:endParaRPr lang="en-US"/>
           </a:p>
         </p:txBody>
       </p:sp>
     </p:spTree>
     <p:extLst>
       <p:ext uri="{BB962C8B-B14F-4D97-AF65-F5344CB8AC3E}">
-        <p14:creationId xmlns:p14="http://schemas.microsoft.com/office/powerpoint/2010/main" val="2645747481"/>
+        <p14:creationId xmlns:p14="http://schemas.microsoft.com/office/powerpoint/2010/main" val="2781622621"/>
       </p:ext>
     </p:extLst>
   </p:cSld>
@@ -5225,4 +6473,299 @@
     </a:ext>
   </a:extLst>
 </a:theme>
+</file>
+
+<file path=ppt/theme/theme2.xml><?xml version="1.0" encoding="utf-8"?>
+<a:theme xmlns:a="http://schemas.openxmlformats.org/drawingml/2006/main" name="Office Theme">
+  <a:themeElements>
+    <a:clrScheme name="Office">
+      <a:dk1>
+        <a:sysClr val="windowText" lastClr="000000"/>
+      </a:dk1>
+      <a:lt1>
+        <a:sysClr val="window" lastClr="FFFFFF"/>
+      </a:lt1>
+      <a:dk2>
+        <a:srgbClr val="44546A"/>
+      </a:dk2>
+      <a:lt2>
+        <a:srgbClr val="E7E6E6"/>
+      </a:lt2>
+      <a:accent1>
+        <a:srgbClr val="4472C4"/>
+      </a:accent1>
+      <a:accent2>
+        <a:srgbClr val="ED7D31"/>
+      </a:accent2>
+      <a:accent3>
+        <a:srgbClr val="A5A5A5"/>
+      </a:accent3>
+      <a:accent4>
+        <a:srgbClr val="FFC000"/>
+      </a:accent4>
+      <a:accent5>
+        <a:srgbClr val="5B9BD5"/>
+      </a:accent5>
+      <a:accent6>
+        <a:srgbClr val="70AD47"/>
+      </a:accent6>
+      <a:hlink>
+        <a:srgbClr val="0563C1"/>
+      </a:hlink>
+      <a:folHlink>
+        <a:srgbClr val="954F72"/>
+      </a:folHlink>
+    </a:clrScheme>
+    <a:fontScheme name="Office">
+      <a:majorFont>
+        <a:latin typeface="Calibri Light" panose="020F0302020204030204"/>
+        <a:ea typeface=""/>
+        <a:cs typeface=""/>
+        <a:font script="Jpan" typeface="游ゴシック Light"/>
+        <a:font script="Hang" typeface="맑은 고딕"/>
+        <a:font script="Hans" typeface="等线 Light"/>
+        <a:font script="Hant" typeface="新細明體"/>
+        <a:font script="Arab" typeface="Times New Roman"/>
+        <a:font script="Hebr" typeface="Times New Roman"/>
+        <a:font script="Thai" typeface="Angsana New"/>
+        <a:font script="Ethi" typeface="Nyala"/>
+        <a:font script="Beng" typeface="Vrinda"/>
+        <a:font script="Gujr" typeface="Shruti"/>
+        <a:font script="Khmr" typeface="MoolBoran"/>
+        <a:font script="Knda" typeface="Tunga"/>
+        <a:font script="Guru" typeface="Raavi"/>
+        <a:font script="Cans" typeface="Euphemia"/>
+        <a:font script="Cher" typeface="Plantagenet Cherokee"/>
+        <a:font script="Yiii" typeface="Microsoft Yi Baiti"/>
+        <a:font script="Tibt" typeface="Microsoft Himalaya"/>
+        <a:font script="Thaa" typeface="MV Boli"/>
+        <a:font script="Deva" typeface="Mangal"/>
+        <a:font script="Telu" typeface="Gautami"/>
+        <a:font script="Taml" typeface="Latha"/>
+        <a:font script="Syrc" typeface="Estrangelo Edessa"/>
+        <a:font script="Orya" typeface="Kalinga"/>
+        <a:font script="Mlym" typeface="Kartika"/>
+        <a:font script="Laoo" typeface="DokChampa"/>
+        <a:font script="Sinh" typeface="Iskoola Pota"/>
+        <a:font script="Mong" typeface="Mongolian Baiti"/>
+        <a:font script="Viet" typeface="Times New Roman"/>
+        <a:font script="Uigh" typeface="Microsoft Uighur"/>
+        <a:font script="Geor" typeface="Sylfaen"/>
+        <a:font script="Armn" typeface="Arial"/>
+        <a:font script="Bugi" typeface="Leelawadee UI"/>
+        <a:font script="Bopo" typeface="Microsoft JhengHei"/>
+        <a:font script="Java" typeface="Javanese Text"/>
+        <a:font script="Lisu" typeface="Segoe UI"/>
+        <a:font script="Mymr" typeface="Myanmar Text"/>
+        <a:font script="Nkoo" typeface="Ebrima"/>
+        <a:font script="Olck" typeface="Nirmala UI"/>
+        <a:font script="Osma" typeface="Ebrima"/>
+        <a:font script="Phag" typeface="Phagspa"/>
+        <a:font script="Syrn" typeface="Estrangelo Edessa"/>
+        <a:font script="Syrj" typeface="Estrangelo Edessa"/>
+        <a:font script="Syre" typeface="Estrangelo Edessa"/>
+        <a:font script="Sora" typeface="Nirmala UI"/>
+        <a:font script="Tale" typeface="Microsoft Tai Le"/>
+        <a:font script="Talu" typeface="Microsoft New Tai Lue"/>
+        <a:font script="Tfng" typeface="Ebrima"/>
+      </a:majorFont>
+      <a:minorFont>
+        <a:latin typeface="Calibri" panose="020F0502020204030204"/>
+        <a:ea typeface=""/>
+        <a:cs typeface=""/>
+        <a:font script="Jpan" typeface="游ゴシック"/>
+        <a:font script="Hang" typeface="맑은 고딕"/>
+        <a:font script="Hans" typeface="等线"/>
+        <a:font script="Hant" typeface="新細明體"/>
+        <a:font script="Arab" typeface="Arial"/>
+        <a:font script="Hebr" typeface="Arial"/>
+        <a:font script="Thai" typeface="Cordia New"/>
+        <a:font script="Ethi" typeface="Nyala"/>
+        <a:font script="Beng" typeface="Vrinda"/>
+        <a:font script="Gujr" typeface="Shruti"/>
+        <a:font script="Khmr" typeface="DaunPenh"/>
+        <a:font script="Knda" typeface="Tunga"/>
+        <a:font script="Guru" typeface="Raavi"/>
+        <a:font script="Cans" typeface="Euphemia"/>
+        <a:font script="Cher" typeface="Plantagenet Cherokee"/>
+        <a:font script="Yiii" typeface="Microsoft Yi Baiti"/>
+        <a:font script="Tibt" typeface="Microsoft Himalaya"/>
+        <a:font script="Thaa" typeface="MV Boli"/>
+        <a:font script="Deva" typeface="Mangal"/>
+        <a:font script="Telu" typeface="Gautami"/>
+        <a:font script="Taml" typeface="Latha"/>
+        <a:font script="Syrc" typeface="Estrangelo Edessa"/>
+        <a:font script="Orya" typeface="Kalinga"/>
+        <a:font script="Mlym" typeface="Kartika"/>
+        <a:font script="Laoo" typeface="DokChampa"/>
+        <a:font script="Sinh" typeface="Iskoola Pota"/>
+        <a:font script="Mong" typeface="Mongolian Baiti"/>
+        <a:font script="Viet" typeface="Arial"/>
+        <a:font script="Uigh" typeface="Microsoft Uighur"/>
+        <a:font script="Geor" typeface="Sylfaen"/>
+        <a:font script="Armn" typeface="Arial"/>
+        <a:font script="Bugi" typeface="Leelawadee UI"/>
+        <a:font script="Bopo" typeface="Microsoft JhengHei"/>
+        <a:font script="Java" typeface="Javanese Text"/>
+        <a:font script="Lisu" typeface="Segoe UI"/>
+        <a:font script="Mymr" typeface="Myanmar Text"/>
+        <a:font script="Nkoo" typeface="Ebrima"/>
+        <a:font script="Olck" typeface="Nirmala UI"/>
+        <a:font script="Osma" typeface="Ebrima"/>
+        <a:font script="Phag" typeface="Phagspa"/>
+        <a:font script="Syrn" typeface="Estrangelo Edessa"/>
+        <a:font script="Syrj" typeface="Estrangelo Edessa"/>
+        <a:font script="Syre" typeface="Estrangelo Edessa"/>
+        <a:font script="Sora" typeface="Nirmala UI"/>
+        <a:font script="Tale" typeface="Microsoft Tai Le"/>
+        <a:font script="Talu" typeface="Microsoft New Tai Lue"/>
+        <a:font script="Tfng" typeface="Ebrima"/>
+      </a:minorFont>
+    </a:fontScheme>
+    <a:fmtScheme name="Office">
+      <a:fillStyleLst>
+        <a:solidFill>
+          <a:schemeClr val="phClr"/>
+        </a:solidFill>
+        <a:gradFill rotWithShape="1">
+          <a:gsLst>
+            <a:gs pos="0">
+              <a:schemeClr val="phClr">
+                <a:lumMod val="110000"/>
+                <a:satMod val="105000"/>
+                <a:tint val="67000"/>
+              </a:schemeClr>
+            </a:gs>
+            <a:gs pos="50000">
+              <a:schemeClr val="phClr">
+                <a:lumMod val="105000"/>
+                <a:satMod val="103000"/>
+                <a:tint val="73000"/>
+              </a:schemeClr>
+            </a:gs>
+            <a:gs pos="100000">
+              <a:schemeClr val="phClr">
+                <a:lumMod val="105000"/>
+                <a:satMod val="109000"/>
+                <a:tint val="81000"/>
+              </a:schemeClr>
+            </a:gs>
+          </a:gsLst>
+          <a:lin ang="5400000" scaled="0"/>
+        </a:gradFill>
+        <a:gradFill rotWithShape="1">
+          <a:gsLst>
+            <a:gs pos="0">
+              <a:schemeClr val="phClr">
+                <a:satMod val="103000"/>
+                <a:lumMod val="102000"/>
+                <a:tint val="94000"/>
+              </a:schemeClr>
+            </a:gs>
+            <a:gs pos="50000">
+              <a:schemeClr val="phClr">
+                <a:satMod val="110000"/>
+                <a:lumMod val="100000"/>
+                <a:shade val="100000"/>
+              </a:schemeClr>
+            </a:gs>
+            <a:gs pos="100000">
+              <a:schemeClr val="phClr">
+                <a:lumMod val="99000"/>
+                <a:satMod val="120000"/>
+                <a:shade val="78000"/>
+              </a:schemeClr>
+            </a:gs>
+          </a:gsLst>
+          <a:lin ang="5400000" scaled="0"/>
+        </a:gradFill>
+      </a:fillStyleLst>
+      <a:lnStyleLst>
+        <a:ln w="6350" cap="flat" cmpd="sng" algn="ctr">
+          <a:solidFill>
+            <a:schemeClr val="phClr"/>
+          </a:solidFill>
+          <a:prstDash val="solid"/>
+          <a:miter lim="800000"/>
+        </a:ln>
+        <a:ln w="12700" cap="flat" cmpd="sng" algn="ctr">
+          <a:solidFill>
+            <a:schemeClr val="phClr"/>
+          </a:solidFill>
+          <a:prstDash val="solid"/>
+          <a:miter lim="800000"/>
+        </a:ln>
+        <a:ln w="19050" cap="flat" cmpd="sng" algn="ctr">
+          <a:solidFill>
+            <a:schemeClr val="phClr"/>
+          </a:solidFill>
+          <a:prstDash val="solid"/>
+          <a:miter lim="800000"/>
+        </a:ln>
+      </a:lnStyleLst>
+      <a:effectStyleLst>
+        <a:effectStyle>
+          <a:effectLst/>
+        </a:effectStyle>
+        <a:effectStyle>
+          <a:effectLst/>
+        </a:effectStyle>
+        <a:effectStyle>
+          <a:effectLst>
+            <a:outerShdw blurRad="57150" dist="19050" dir="5400000" algn="ctr" rotWithShape="0">
+              <a:srgbClr val="000000">
+                <a:alpha val="63000"/>
+              </a:srgbClr>
+            </a:outerShdw>
+          </a:effectLst>
+        </a:effectStyle>
+      </a:effectStyleLst>
+      <a:bgFillStyleLst>
+        <a:solidFill>
+          <a:schemeClr val="phClr"/>
+        </a:solidFill>
+        <a:solidFill>
+          <a:schemeClr val="phClr">
+            <a:tint val="95000"/>
+            <a:satMod val="170000"/>
+          </a:schemeClr>
+        </a:solidFill>
+        <a:gradFill rotWithShape="1">
+          <a:gsLst>
+            <a:gs pos="0">
+              <a:schemeClr val="phClr">
+                <a:tint val="93000"/>
+                <a:satMod val="150000"/>
+                <a:shade val="98000"/>
+                <a:lumMod val="102000"/>
+              </a:schemeClr>
+            </a:gs>
+            <a:gs pos="50000">
+              <a:schemeClr val="phClr">
+                <a:tint val="98000"/>
+                <a:satMod val="130000"/>
+                <a:shade val="90000"/>
+                <a:lumMod val="103000"/>
+              </a:schemeClr>
+            </a:gs>
+            <a:gs pos="100000">
+              <a:schemeClr val="phClr">
+                <a:shade val="63000"/>
+                <a:satMod val="120000"/>
+              </a:schemeClr>
+            </a:gs>
+          </a:gsLst>
+          <a:lin ang="5400000" scaled="0"/>
+        </a:gradFill>
+      </a:bgFillStyleLst>
+    </a:fmtScheme>
+  </a:themeElements>
+  <a:objectDefaults/>
+  <a:extraClrSchemeLst/>
+  <a:extLst>
+    <a:ext uri="{05A4C25C-085E-4340-85A3-A5531E510DB2}">
+      <thm15:themeFamily xmlns:thm15="http://schemas.microsoft.com/office/thememl/2012/main" name="Office Theme" id="{62F939B6-93AF-4DB8-9C6B-D6C7DFDC589F}" vid="{4A3C46E8-61CC-4603-A589-7422A47A8E4A}"/>
+    </a:ext>
+  </a:extLst>
+</a:theme>
 </file>
</xml_diff>

<commit_message>
presentation PP updated for team review
</commit_message>
<xml_diff>
--- a/Presentation PowerPoint/Project-Presentation-Template.pptx
+++ b/Presentation PowerPoint/Project-Presentation-Template.pptx
@@ -5021,7 +5021,9 @@
         </p:nvSpPr>
         <p:spPr/>
         <p:txBody>
-          <a:bodyPr/>
+          <a:bodyPr>
+            <a:normAutofit lnSpcReduction="10000"/>
+          </a:bodyPr>
           <a:lstStyle/>
           <a:p>
             <a:pPr marL="0" indent="0">
@@ -5046,60 +5048,90 @@
           <a:p>
             <a:pPr lvl="1"/>
             <a:r>
-              <a:rPr lang="en-US" sz="1800" b="0" i="1" dirty="0">
+              <a:rPr lang="en-US" b="0" i="1" dirty="0">
+                <a:solidFill>
+                  <a:srgbClr val="002060"/>
+                </a:solidFill>
                 <a:effectLst/>
               </a:rPr>
               <a:t>Free</a:t>
             </a:r>
-            <a:endParaRPr lang="en-US" sz="1800" b="0" dirty="0">
+            <a:endParaRPr lang="en-US" b="0" dirty="0">
+              <a:solidFill>
+                <a:srgbClr val="002060"/>
+              </a:solidFill>
               <a:effectLst/>
             </a:endParaRPr>
           </a:p>
           <a:p>
             <a:pPr lvl="1"/>
             <a:r>
-              <a:rPr lang="en-US" sz="1800" b="0" i="1" dirty="0">
+              <a:rPr lang="en-US" b="0" i="1" dirty="0">
+                <a:solidFill>
+                  <a:srgbClr val="002060"/>
+                </a:solidFill>
                 <a:effectLst/>
               </a:rPr>
               <a:t>Limited to 2k API Calls daily</a:t>
             </a:r>
-            <a:endParaRPr lang="en-US" sz="1800" b="0" dirty="0">
+            <a:endParaRPr lang="en-US" b="0" dirty="0">
+              <a:solidFill>
+                <a:srgbClr val="002060"/>
+              </a:solidFill>
               <a:effectLst/>
             </a:endParaRPr>
           </a:p>
           <a:p>
             <a:pPr lvl="1"/>
             <a:r>
-              <a:rPr lang="en-US" sz="1800" b="0" i="1" dirty="0">
+              <a:rPr lang="en-US" b="0" i="1" dirty="0">
+                <a:solidFill>
+                  <a:srgbClr val="002060"/>
+                </a:solidFill>
                 <a:effectLst/>
               </a:rPr>
               <a:t>Free testing plan for evaluation only</a:t>
             </a:r>
-            <a:endParaRPr lang="en-US" sz="1800" b="0" dirty="0">
+            <a:endParaRPr lang="en-US" b="0" dirty="0">
+              <a:solidFill>
+                <a:srgbClr val="002060"/>
+              </a:solidFill>
               <a:effectLst/>
             </a:endParaRPr>
           </a:p>
           <a:p>
             <a:pPr lvl="1"/>
             <a:r>
-              <a:rPr lang="en-US" sz="1800" b="0" i="1" dirty="0">
+              <a:rPr lang="en-US" b="0" i="1" dirty="0">
+                <a:solidFill>
+                  <a:srgbClr val="002060"/>
+                </a:solidFill>
                 <a:effectLst/>
               </a:rPr>
               <a:t>Access to ONLY 30% of lyrics per song</a:t>
             </a:r>
-            <a:endParaRPr lang="en-US" sz="1800" b="0" dirty="0">
+            <a:endParaRPr lang="en-US" b="0" dirty="0">
+              <a:solidFill>
+                <a:srgbClr val="002060"/>
+              </a:solidFill>
               <a:effectLst/>
             </a:endParaRPr>
           </a:p>
           <a:p>
             <a:pPr lvl="1"/>
             <a:r>
-              <a:rPr lang="en-US" sz="1800" b="0" i="1" dirty="0">
+              <a:rPr lang="en-US" b="0" i="1" dirty="0">
+                <a:solidFill>
+                  <a:srgbClr val="002060"/>
+                </a:solidFill>
                 <a:effectLst/>
               </a:rPr>
               <a:t>Understanding which part of the song (beginning, middle, end) contains the lyrics that are needed to be best analyzed for our dataset.</a:t>
             </a:r>
-            <a:endParaRPr lang="en-US" sz="1800" b="0" dirty="0">
+            <a:endParaRPr lang="en-US" b="0" dirty="0">
+              <a:solidFill>
+                <a:srgbClr val="002060"/>
+              </a:solidFill>
               <a:effectLst/>
             </a:endParaRPr>
           </a:p>
@@ -5109,7 +5141,46 @@
             </a:endParaRPr>
           </a:p>
           <a:p>
-            <a:endParaRPr lang="en-US" dirty="0"/>
+            <a:r>
+              <a:rPr lang="en-US" dirty="0" err="1">
+                <a:solidFill>
+                  <a:srgbClr val="FFC000"/>
+                </a:solidFill>
+              </a:rPr>
+              <a:t>Genius.com</a:t>
+            </a:r>
+            <a:r>
+              <a:rPr lang="en-US" dirty="0">
+                <a:solidFill>
+                  <a:srgbClr val="FFC000"/>
+                </a:solidFill>
+              </a:rPr>
+              <a:t> </a:t>
+            </a:r>
+            <a:r>
+              <a:rPr lang="en-US" dirty="0">
+                <a:solidFill>
+                  <a:srgbClr val="002060"/>
+                </a:solidFill>
+              </a:rPr>
+              <a:t>was web scrapped to get full lyrical content of songs as a solution to only having access to the </a:t>
+            </a:r>
+            <a:r>
+              <a:rPr lang="en-US" dirty="0" err="1">
+                <a:solidFill>
+                  <a:srgbClr val="002060"/>
+                </a:solidFill>
+              </a:rPr>
+              <a:t>musixmatch</a:t>
+            </a:r>
+            <a:r>
+              <a:rPr lang="en-US" dirty="0">
+                <a:solidFill>
+                  <a:srgbClr val="002060"/>
+                </a:solidFill>
+              </a:rPr>
+              <a:t> free 30% of lyrics per song.</a:t>
+            </a:r>
           </a:p>
         </p:txBody>
       </p:sp>
@@ -5194,40 +5265,63 @@
           <a:p>
             <a:r>
               <a:rPr lang="en-US" sz="2800" b="0" dirty="0">
+                <a:solidFill>
+                  <a:srgbClr val="0070C0"/>
+                </a:solidFill>
                 <a:effectLst/>
               </a:rPr>
               <a:t>Harsh </a:t>
             </a:r>
             <a:r>
               <a:rPr lang="en-US" sz="2800" b="0" dirty="0" err="1">
+                <a:solidFill>
+                  <a:srgbClr val="0070C0"/>
+                </a:solidFill>
                 <a:effectLst/>
               </a:rPr>
               <a:t>Bolakani</a:t>
             </a:r>
             <a:endParaRPr lang="en-US" sz="2800" b="0" dirty="0">
+              <a:solidFill>
+                <a:srgbClr val="0070C0"/>
+              </a:solidFill>
               <a:effectLst/>
             </a:endParaRPr>
           </a:p>
           <a:p>
             <a:pPr lvl="1"/>
             <a:r>
-              <a:rPr lang="en-US" dirty="0"/>
+              <a:rPr lang="en-US" dirty="0">
+                <a:solidFill>
+                  <a:srgbClr val="0070C0"/>
+                </a:solidFill>
+              </a:rPr>
               <a:t>Words…</a:t>
             </a:r>
           </a:p>
           <a:p>
             <a:pPr lvl="1"/>
             <a:r>
-              <a:rPr lang="en-US" dirty="0"/>
+              <a:rPr lang="en-US" dirty="0">
+                <a:solidFill>
+                  <a:srgbClr val="0070C0"/>
+                </a:solidFill>
+              </a:rPr>
               <a:t>Words…</a:t>
             </a:r>
             <a:endParaRPr lang="en-US" b="0" dirty="0">
+              <a:solidFill>
+                <a:srgbClr val="0070C0"/>
+              </a:solidFill>
               <a:effectLst/>
             </a:endParaRPr>
           </a:p>
           <a:p>
             <a:r>
               <a:rPr lang="en-US" sz="2800" b="0" dirty="0">
+                <a:solidFill>
+                  <a:srgbClr val="002060"/>
+                </a:solidFill>
                 <a:effectLst/>
               </a:rPr>
               <a:t>Greg Morgan</a:t>
@@ -5236,23 +5330,37 @@
           <a:p>
             <a:pPr lvl="1"/>
             <a:r>
-              <a:rPr lang="en-US" dirty="0"/>
+              <a:rPr lang="en-US" dirty="0">
+                <a:solidFill>
+                  <a:srgbClr val="002060"/>
+                </a:solidFill>
+              </a:rPr>
               <a:t>Words…</a:t>
             </a:r>
           </a:p>
           <a:p>
             <a:pPr lvl="1"/>
             <a:r>
-              <a:rPr lang="en-US" dirty="0"/>
+              <a:rPr lang="en-US" dirty="0">
+                <a:solidFill>
+                  <a:srgbClr val="002060"/>
+                </a:solidFill>
+              </a:rPr>
               <a:t>Words…</a:t>
             </a:r>
             <a:endParaRPr lang="en-US" b="0" dirty="0">
+              <a:solidFill>
+                <a:srgbClr val="002060"/>
+              </a:solidFill>
               <a:effectLst/>
             </a:endParaRPr>
           </a:p>
           <a:p>
             <a:r>
               <a:rPr lang="en-US" sz="2800" b="0" dirty="0">
+                <a:solidFill>
+                  <a:srgbClr val="7030A0"/>
+                </a:solidFill>
                 <a:effectLst/>
               </a:rPr>
               <a:t>Trevor Pawlewicz</a:t>
@@ -5261,20 +5369,24 @@
           <a:p>
             <a:pPr lvl="1"/>
             <a:r>
-              <a:rPr lang="en-US" dirty="0"/>
-              <a:t>Words…</a:t>
+              <a:rPr lang="en-US" dirty="0">
+                <a:solidFill>
+                  <a:srgbClr val="7030A0"/>
+                </a:solidFill>
+              </a:rPr>
+              <a:t>Idea concept</a:t>
             </a:r>
           </a:p>
           <a:p>
             <a:pPr lvl="1"/>
             <a:r>
-              <a:rPr lang="en-US" dirty="0"/>
-              <a:t>Words…</a:t>
-            </a:r>
-          </a:p>
-          <a:p>
-            <a:pPr lvl="1"/>
-            <a:endParaRPr lang="en-US" dirty="0"/>
+              <a:rPr lang="en-US" dirty="0">
+                <a:solidFill>
+                  <a:srgbClr val="7030A0"/>
+                </a:solidFill>
+              </a:rPr>
+              <a:t>Product management</a:t>
+            </a:r>
           </a:p>
         </p:txBody>
       </p:sp>
@@ -8548,9 +8660,8 @@
         </p:nvPicPr>
         <p:blipFill>
           <a:blip r:embed="rId3"/>
-          <a:stretch>
-            <a:fillRect/>
-          </a:stretch>
+          <a:srcRect/>
+          <a:stretch/>
         </p:blipFill>
         <p:spPr>
           <a:xfrm>
@@ -8581,12 +8692,12 @@
         <p:spPr>
           <a:xfrm>
             <a:off x="5596502" y="1537855"/>
-            <a:ext cx="5930480" cy="4599709"/>
+            <a:ext cx="5930480" cy="4862517"/>
           </a:xfrm>
         </p:spPr>
         <p:txBody>
           <a:bodyPr anchor="t">
-            <a:normAutofit/>
+            <a:normAutofit fontScale="92500" lnSpcReduction="10000"/>
           </a:bodyPr>
           <a:lstStyle/>
           <a:p>
@@ -8594,33 +8705,122 @@
               <a:buNone/>
             </a:pPr>
             <a:r>
-              <a:rPr lang="en-US" b="0" i="0" u="none" strike="noStrike" dirty="0" err="1">
+              <a:rPr lang="en-US" b="1" i="0" u="none" strike="noStrike" dirty="0" err="1">
                 <a:solidFill>
                   <a:srgbClr val="292929"/>
                 </a:solidFill>
                 <a:effectLst/>
-                <a:latin typeface="fell"/>
               </a:rPr>
               <a:t>Genius.com</a:t>
             </a:r>
             <a:r>
-              <a:rPr lang="en-US" b="0" i="0" u="none" strike="noStrike" dirty="0">
+              <a:rPr lang="en-US" b="1" dirty="0">
                 <a:solidFill>
                   <a:srgbClr val="292929"/>
                 </a:solidFill>
+              </a:rPr>
+              <a:t>:</a:t>
+            </a:r>
+            <a:r>
+              <a:rPr lang="en-US" b="1" i="0" u="none" strike="noStrike" dirty="0">
+                <a:solidFill>
+                  <a:srgbClr val="292929"/>
+                </a:solidFill>
                 <a:effectLst/>
-                <a:latin typeface="fell"/>
-              </a:rPr>
-              <a:t> for Web scraping song lyrics</a:t>
-            </a:r>
+              </a:rPr>
+              <a:t> web scraping song lyrics</a:t>
+            </a:r>
+          </a:p>
+          <a:p>
+            <a:pPr marL="0" indent="0" algn="l">
+              <a:buNone/>
+            </a:pPr>
+            <a:endParaRPr lang="en-US" b="1" i="0" u="none" strike="noStrike" dirty="0">
+              <a:solidFill>
+                <a:srgbClr val="292929"/>
+              </a:solidFill>
+              <a:effectLst/>
+            </a:endParaRPr>
           </a:p>
           <a:p>
             <a:pPr marL="0" indent="0">
               <a:buNone/>
             </a:pPr>
             <a:r>
-              <a:rPr lang="en-US" sz="1800" dirty="0"/>
-              <a:t>Words…</a:t>
+              <a:rPr lang="en-US" sz="2600" dirty="0">
+                <a:solidFill>
+                  <a:srgbClr val="002060"/>
+                </a:solidFill>
+              </a:rPr>
+              <a:t>The world's biggest music encyclopedia with a passionate community of more than two million contributors, Genius is a destination for artists, creatives, and superfans to discuss and deconstruct all things music.</a:t>
+            </a:r>
+          </a:p>
+          <a:p>
+            <a:pPr marL="0" indent="0">
+              <a:buNone/>
+            </a:pPr>
+            <a:endParaRPr lang="en-US" sz="2600" dirty="0">
+              <a:solidFill>
+                <a:srgbClr val="002060"/>
+              </a:solidFill>
+            </a:endParaRPr>
+          </a:p>
+          <a:p>
+            <a:pPr marL="0" indent="0">
+              <a:buNone/>
+            </a:pPr>
+            <a:r>
+              <a:rPr lang="en-US" sz="2600" dirty="0">
+                <a:solidFill>
+                  <a:srgbClr val="002060"/>
+                </a:solidFill>
+              </a:rPr>
+              <a:t>Founded in 2009, Genius is a unique media company that serves music knowledge to over 100 million people each month on </a:t>
+            </a:r>
+            <a:r>
+              <a:rPr lang="en-US" sz="2600" dirty="0" err="1">
+                <a:solidFill>
+                  <a:srgbClr val="002060"/>
+                </a:solidFill>
+              </a:rPr>
+              <a:t>Genius.com</a:t>
+            </a:r>
+            <a:r>
+              <a:rPr lang="en-US" sz="2600" dirty="0">
+                <a:solidFill>
+                  <a:srgbClr val="002060"/>
+                </a:solidFill>
+              </a:rPr>
+              <a:t> and everywhere music fans connect across the internet.</a:t>
+            </a:r>
+          </a:p>
+          <a:p>
+            <a:pPr marL="0" indent="0">
+              <a:buNone/>
+            </a:pPr>
+            <a:r>
+              <a:rPr lang="en-US" sz="1500" dirty="0">
+                <a:solidFill>
+                  <a:srgbClr val="00B0F0"/>
+                </a:solidFill>
+              </a:rPr>
+              <a:t>https://</a:t>
+            </a:r>
+            <a:r>
+              <a:rPr lang="en-US" sz="1500" dirty="0" err="1">
+                <a:solidFill>
+                  <a:srgbClr val="00B0F0"/>
+                </a:solidFill>
+              </a:rPr>
+              <a:t>genius.com</a:t>
+            </a:r>
+            <a:r>
+              <a:rPr lang="en-US" sz="1500" dirty="0">
+                <a:solidFill>
+                  <a:srgbClr val="00B0F0"/>
+                </a:solidFill>
+              </a:rPr>
+              <a:t>/</a:t>
             </a:r>
           </a:p>
         </p:txBody>
@@ -8959,7 +9159,25 @@
                 </a:solidFill>
                 <a:effectLst/>
               </a:rPr>
-              <a:t>Register for an API key</a:t>
+              <a:t>Register for an API key (</a:t>
+            </a:r>
+            <a:r>
+              <a:rPr lang="en-US" sz="2400" i="0" u="none" strike="noStrike" dirty="0" err="1">
+                <a:solidFill>
+                  <a:srgbClr val="FF4376"/>
+                </a:solidFill>
+                <a:effectLst/>
+              </a:rPr>
+              <a:t>musixmatch</a:t>
+            </a:r>
+            <a:r>
+              <a:rPr lang="en-US" sz="2400" i="0" u="none" strike="noStrike" dirty="0">
+                <a:solidFill>
+                  <a:srgbClr val="002060"/>
+                </a:solidFill>
+                <a:effectLst/>
+              </a:rPr>
+              <a:t>)</a:t>
             </a:r>
           </a:p>
           <a:p>
@@ -8974,7 +9192,25 @@
                 </a:solidFill>
                 <a:effectLst/>
               </a:rPr>
-              <a:t>Setup Imports and API Authentication</a:t>
+              <a:t>Setup Imports and API Authentication (</a:t>
+            </a:r>
+            <a:r>
+              <a:rPr lang="en-US" sz="2400" i="0" u="none" strike="noStrike" dirty="0" err="1">
+                <a:solidFill>
+                  <a:srgbClr val="FF4376"/>
+                </a:solidFill>
+                <a:effectLst/>
+              </a:rPr>
+              <a:t>musixmatch</a:t>
+            </a:r>
+            <a:r>
+              <a:rPr lang="en-US" sz="2400" i="0" u="none" strike="noStrike" dirty="0">
+                <a:solidFill>
+                  <a:srgbClr val="002060"/>
+                </a:solidFill>
+                <a:effectLst/>
+              </a:rPr>
+              <a:t>)</a:t>
             </a:r>
           </a:p>
           <a:p>
@@ -9006,7 +9242,25 @@
                 </a:solidFill>
                 <a:effectLst/>
               </a:rPr>
-              <a:t>ong list from URL with parameters for a data query </a:t>
+              <a:t>ong list from URL with parameters for a data query (</a:t>
+            </a:r>
+            <a:r>
+              <a:rPr lang="en-US" sz="2400" i="0" u="none" strike="noStrike" dirty="0">
+                <a:solidFill>
+                  <a:srgbClr val="FFC000"/>
+                </a:solidFill>
+                <a:effectLst/>
+              </a:rPr>
+              <a:t>genius</a:t>
+            </a:r>
+            <a:r>
+              <a:rPr lang="en-US" sz="2400" i="0" u="none" strike="noStrike" dirty="0">
+                <a:solidFill>
+                  <a:srgbClr val="002060"/>
+                </a:solidFill>
+                <a:effectLst/>
+              </a:rPr>
+              <a:t>)</a:t>
             </a:r>
           </a:p>
           <a:p>
@@ -9021,7 +9275,25 @@
                 </a:solidFill>
                 <a:effectLst/>
               </a:rPr>
-              <a:t>Scrape Lyric Data with Beautiful Soup</a:t>
+              <a:t>Scrape Lyric Data with Beautiful Soup (</a:t>
+            </a:r>
+            <a:r>
+              <a:rPr lang="en-US" sz="2400" i="0" u="none" strike="noStrike" dirty="0">
+                <a:solidFill>
+                  <a:srgbClr val="FFC000"/>
+                </a:solidFill>
+                <a:effectLst/>
+              </a:rPr>
+              <a:t>genius</a:t>
+            </a:r>
+            <a:r>
+              <a:rPr lang="en-US" sz="2400" i="0" u="none" strike="noStrike" dirty="0">
+                <a:solidFill>
+                  <a:srgbClr val="002060"/>
+                </a:solidFill>
+                <a:effectLst/>
+              </a:rPr>
+              <a:t>)</a:t>
             </a:r>
           </a:p>
           <a:p>
@@ -9755,14 +10027,109 @@
           </a:p>
           <a:p>
             <a:r>
-              <a:rPr lang="en-US" b="0" dirty="0">
-                <a:effectLst/>
-              </a:rPr>
-              <a:t>offer our large-scale lyrics dataset designed to allow machine learning companies and researchers use a wide range of applications like lyrics text analysis which creates music recommendations and provides insights.</a:t>
-            </a:r>
-          </a:p>
-          <a:p>
-            <a:endParaRPr lang="en-US" dirty="0"/>
+              <a:rPr lang="en-US" dirty="0">
+                <a:solidFill>
+                  <a:srgbClr val="002060"/>
+                </a:solidFill>
+              </a:rPr>
+              <a:t>Must register in order to get your </a:t>
+            </a:r>
+            <a:r>
+              <a:rPr lang="en-US" b="1" dirty="0">
+                <a:solidFill>
+                  <a:srgbClr val="002060"/>
+                </a:solidFill>
+              </a:rPr>
+              <a:t>API</a:t>
+            </a:r>
+            <a:r>
+              <a:rPr lang="en-US" dirty="0">
+                <a:solidFill>
+                  <a:srgbClr val="002060"/>
+                </a:solidFill>
+              </a:rPr>
+              <a:t> key, a mandatory parameter for most of </a:t>
+            </a:r>
+            <a:r>
+              <a:rPr lang="en-US" dirty="0" err="1">
+                <a:solidFill>
+                  <a:srgbClr val="002060"/>
+                </a:solidFill>
+              </a:rPr>
+              <a:t>musixmatch</a:t>
+            </a:r>
+            <a:r>
+              <a:rPr lang="en-US" dirty="0">
+                <a:solidFill>
+                  <a:srgbClr val="002060"/>
+                </a:solidFill>
+              </a:rPr>
+              <a:t> </a:t>
+            </a:r>
+            <a:r>
+              <a:rPr lang="en-US" b="1" dirty="0">
+                <a:solidFill>
+                  <a:srgbClr val="002060"/>
+                </a:solidFill>
+              </a:rPr>
+              <a:t>API</a:t>
+            </a:r>
+            <a:r>
+              <a:rPr lang="en-US" dirty="0">
+                <a:solidFill>
+                  <a:srgbClr val="002060"/>
+                </a:solidFill>
+              </a:rPr>
+              <a:t> calls. It’s your personal identifier and should be kept secret.</a:t>
+            </a:r>
+          </a:p>
+          <a:p>
+            <a:r>
+              <a:rPr lang="en-US" dirty="0">
+                <a:solidFill>
+                  <a:srgbClr val="002060"/>
+                </a:solidFill>
+              </a:rPr>
+              <a:t>Implement two </a:t>
+            </a:r>
+            <a:r>
+              <a:rPr lang="en-US" b="1" dirty="0">
+                <a:solidFill>
+                  <a:srgbClr val="002060"/>
+                </a:solidFill>
+              </a:rPr>
+              <a:t>API</a:t>
+            </a:r>
+            <a:r>
+              <a:rPr lang="en-US" dirty="0">
+                <a:solidFill>
+                  <a:srgbClr val="002060"/>
+                </a:solidFill>
+              </a:rPr>
+              <a:t> calls: </a:t>
+            </a:r>
+          </a:p>
+          <a:p>
+            <a:pPr lvl="1"/>
+            <a:r>
+              <a:rPr lang="en-US" dirty="0">
+                <a:solidFill>
+                  <a:srgbClr val="002060"/>
+                </a:solidFill>
+              </a:rPr>
+              <a:t>The first call is to match your catalog to ours using the search function.</a:t>
+            </a:r>
+          </a:p>
+          <a:p>
+            <a:pPr lvl="1"/>
+            <a:r>
+              <a:rPr lang="en-US" dirty="0">
+                <a:solidFill>
+                  <a:srgbClr val="002060"/>
+                </a:solidFill>
+              </a:rPr>
+              <a:t>The second is to get the lyrics.</a:t>
+            </a:r>
           </a:p>
         </p:txBody>
       </p:sp>

</xml_diff>